<commit_message>
adding ppt and webex demo
</commit_message>
<xml_diff>
--- a/Machine_Learning_Chicago_Crime_Dataset.pptx
+++ b/Machine_Learning_Chicago_Crime_Dataset.pptx
@@ -5,10 +5,10 @@
     <p:sldMasterId id="2147483672" r:id="rId4"/>
   </p:sldMasterIdLst>
   <p:notesMasterIdLst>
-    <p:notesMasterId r:id="rId26"/>
+    <p:notesMasterId r:id="rId28"/>
   </p:notesMasterIdLst>
   <p:handoutMasterIdLst>
-    <p:handoutMasterId r:id="rId27"/>
+    <p:handoutMasterId r:id="rId29"/>
   </p:handoutMasterIdLst>
   <p:sldIdLst>
     <p:sldId id="256" r:id="rId5"/>
@@ -16,22 +16,24 @@
     <p:sldId id="264" r:id="rId7"/>
     <p:sldId id="284" r:id="rId8"/>
     <p:sldId id="265" r:id="rId9"/>
-    <p:sldId id="261" r:id="rId10"/>
-    <p:sldId id="286" r:id="rId11"/>
-    <p:sldId id="287" r:id="rId12"/>
-    <p:sldId id="270" r:id="rId13"/>
-    <p:sldId id="292" r:id="rId14"/>
-    <p:sldId id="288" r:id="rId15"/>
-    <p:sldId id="289" r:id="rId16"/>
-    <p:sldId id="291" r:id="rId17"/>
-    <p:sldId id="290" r:id="rId18"/>
-    <p:sldId id="280" r:id="rId19"/>
-    <p:sldId id="281" r:id="rId20"/>
-    <p:sldId id="273" r:id="rId21"/>
-    <p:sldId id="275" r:id="rId22"/>
-    <p:sldId id="259" r:id="rId23"/>
-    <p:sldId id="285" r:id="rId24"/>
-    <p:sldId id="260" r:id="rId25"/>
+    <p:sldId id="293" r:id="rId10"/>
+    <p:sldId id="294" r:id="rId11"/>
+    <p:sldId id="261" r:id="rId12"/>
+    <p:sldId id="286" r:id="rId13"/>
+    <p:sldId id="287" r:id="rId14"/>
+    <p:sldId id="270" r:id="rId15"/>
+    <p:sldId id="292" r:id="rId16"/>
+    <p:sldId id="288" r:id="rId17"/>
+    <p:sldId id="289" r:id="rId18"/>
+    <p:sldId id="291" r:id="rId19"/>
+    <p:sldId id="290" r:id="rId20"/>
+    <p:sldId id="280" r:id="rId21"/>
+    <p:sldId id="281" r:id="rId22"/>
+    <p:sldId id="273" r:id="rId23"/>
+    <p:sldId id="275" r:id="rId24"/>
+    <p:sldId id="259" r:id="rId25"/>
+    <p:sldId id="285" r:id="rId26"/>
+    <p:sldId id="260" r:id="rId27"/>
   </p:sldIdLst>
   <p:sldSz cx="12192000" cy="6858000"/>
   <p:notesSz cx="6858000" cy="9144000"/>
@@ -20661,7 +20663,7 @@
           <a:p>
             <a:fld id="{4929A4FD-FAFB-4CDA-9DC5-D20CA18269A9}" type="datetimeFigureOut">
               <a:rPr lang="en-US" smtClean="0"/>
-              <a:t>10/29/2019</a:t>
+              <a:t>10/30/2019</a:t>
             </a:fld>
             <a:endParaRPr lang="en-US" dirty="0"/>
           </a:p>
@@ -20838,7 +20840,7 @@
           <a:p>
             <a:fld id="{CB91E35E-F34C-4F0E-B8A1-D9F5F49CB3AD}" type="datetimeFigureOut">
               <a:rPr lang="en-US" smtClean="0"/>
-              <a:t>10/29/2019</a:t>
+              <a:t>10/30/2019</a:t>
             </a:fld>
             <a:endParaRPr lang="en-US" dirty="0"/>
           </a:p>
@@ -21254,7 +21256,175 @@
           <a:p>
             <a:fld id="{CD3F15BC-4AA1-41C4-8C26-91A7E3BB93DC}" type="slidenum">
               <a:rPr lang="en-US" smtClean="0"/>
+              <a:t>20</a:t>
+            </a:fld>
+            <a:endParaRPr lang="en-US" dirty="0"/>
+          </a:p>
+        </p:txBody>
+      </p:sp>
+    </p:spTree>
+    <p:extLst>
+      <p:ext uri="{BB962C8B-B14F-4D97-AF65-F5344CB8AC3E}">
+        <p14:creationId xmlns:p14="http://schemas.microsoft.com/office/powerpoint/2010/main" val="1738381787"/>
+      </p:ext>
+    </p:extLst>
+  </p:cSld>
+  <p:clrMapOvr>
+    <a:masterClrMapping/>
+  </p:clrMapOvr>
+</p:notes>
+</file>
+
+<file path=ppt/notesSlides/notesSlide11.xml><?xml version="1.0" encoding="utf-8"?>
+<p:notes xmlns:a="http://schemas.openxmlformats.org/drawingml/2006/main" xmlns:r="http://schemas.openxmlformats.org/officeDocument/2006/relationships" xmlns:p="http://schemas.openxmlformats.org/presentationml/2006/main">
+  <p:cSld>
+    <p:spTree>
+      <p:nvGrpSpPr>
+        <p:cNvPr id="1" name=""/>
+        <p:cNvGrpSpPr/>
+        <p:nvPr/>
+      </p:nvGrpSpPr>
+      <p:grpSpPr>
+        <a:xfrm>
+          <a:off x="0" y="0"/>
+          <a:ext cx="0" cy="0"/>
+          <a:chOff x="0" y="0"/>
+          <a:chExt cx="0" cy="0"/>
+        </a:xfrm>
+      </p:grpSpPr>
+      <p:sp>
+        <p:nvSpPr>
+          <p:cNvPr id="2" name="Slide Image Placeholder 1"/>
+          <p:cNvSpPr>
+            <a:spLocks noGrp="1" noRot="1" noChangeAspect="1"/>
+          </p:cNvSpPr>
+          <p:nvPr>
+            <p:ph type="sldImg"/>
+          </p:nvPr>
+        </p:nvSpPr>
+        <p:spPr/>
+      </p:sp>
+      <p:sp>
+        <p:nvSpPr>
+          <p:cNvPr id="3" name="Notes Placeholder 2"/>
+          <p:cNvSpPr>
+            <a:spLocks noGrp="1"/>
+          </p:cNvSpPr>
+          <p:nvPr>
+            <p:ph type="body" idx="1"/>
+          </p:nvPr>
+        </p:nvSpPr>
+        <p:spPr/>
+        <p:txBody>
+          <a:bodyPr/>
+          <a:lstStyle/>
+          <a:p>
+            <a:endParaRPr lang="en-US" dirty="0"/>
+          </a:p>
+        </p:txBody>
+      </p:sp>
+      <p:sp>
+        <p:nvSpPr>
+          <p:cNvPr id="4" name="Slide Number Placeholder 3"/>
+          <p:cNvSpPr>
+            <a:spLocks noGrp="1"/>
+          </p:cNvSpPr>
+          <p:nvPr>
+            <p:ph type="sldNum" sz="quarter" idx="5"/>
+          </p:nvPr>
+        </p:nvSpPr>
+        <p:spPr/>
+        <p:txBody>
+          <a:bodyPr/>
+          <a:lstStyle/>
+          <a:p>
+            <a:fld id="{CD3F15BC-4AA1-41C4-8C26-91A7E3BB93DC}" type="slidenum">
+              <a:rPr lang="en-US" smtClean="0"/>
               <a:t>21</a:t>
+            </a:fld>
+            <a:endParaRPr lang="en-US" dirty="0"/>
+          </a:p>
+        </p:txBody>
+      </p:sp>
+    </p:spTree>
+    <p:extLst>
+      <p:ext uri="{BB962C8B-B14F-4D97-AF65-F5344CB8AC3E}">
+        <p14:creationId xmlns:p14="http://schemas.microsoft.com/office/powerpoint/2010/main" val="1667354985"/>
+      </p:ext>
+    </p:extLst>
+  </p:cSld>
+  <p:clrMapOvr>
+    <a:masterClrMapping/>
+  </p:clrMapOvr>
+</p:notes>
+</file>
+
+<file path=ppt/notesSlides/notesSlide12.xml><?xml version="1.0" encoding="utf-8"?>
+<p:notes xmlns:a="http://schemas.openxmlformats.org/drawingml/2006/main" xmlns:r="http://schemas.openxmlformats.org/officeDocument/2006/relationships" xmlns:p="http://schemas.openxmlformats.org/presentationml/2006/main">
+  <p:cSld>
+    <p:spTree>
+      <p:nvGrpSpPr>
+        <p:cNvPr id="1" name=""/>
+        <p:cNvGrpSpPr/>
+        <p:nvPr/>
+      </p:nvGrpSpPr>
+      <p:grpSpPr>
+        <a:xfrm>
+          <a:off x="0" y="0"/>
+          <a:ext cx="0" cy="0"/>
+          <a:chOff x="0" y="0"/>
+          <a:chExt cx="0" cy="0"/>
+        </a:xfrm>
+      </p:grpSpPr>
+      <p:sp>
+        <p:nvSpPr>
+          <p:cNvPr id="2" name="Slide Image Placeholder 1"/>
+          <p:cNvSpPr>
+            <a:spLocks noGrp="1" noRot="1" noChangeAspect="1"/>
+          </p:cNvSpPr>
+          <p:nvPr>
+            <p:ph type="sldImg"/>
+          </p:nvPr>
+        </p:nvSpPr>
+        <p:spPr/>
+      </p:sp>
+      <p:sp>
+        <p:nvSpPr>
+          <p:cNvPr id="3" name="Notes Placeholder 2"/>
+          <p:cNvSpPr>
+            <a:spLocks noGrp="1"/>
+          </p:cNvSpPr>
+          <p:nvPr>
+            <p:ph type="body" idx="1"/>
+          </p:nvPr>
+        </p:nvSpPr>
+        <p:spPr/>
+        <p:txBody>
+          <a:bodyPr/>
+          <a:lstStyle/>
+          <a:p>
+            <a:endParaRPr lang="en-US" dirty="0"/>
+          </a:p>
+        </p:txBody>
+      </p:sp>
+      <p:sp>
+        <p:nvSpPr>
+          <p:cNvPr id="4" name="Slide Number Placeholder 3"/>
+          <p:cNvSpPr>
+            <a:spLocks noGrp="1"/>
+          </p:cNvSpPr>
+          <p:nvPr>
+            <p:ph type="sldNum" sz="quarter" idx="5"/>
+          </p:nvPr>
+        </p:nvSpPr>
+        <p:spPr/>
+        <p:txBody>
+          <a:bodyPr/>
+          <a:lstStyle/>
+          <a:p>
+            <a:fld id="{CD3F15BC-4AA1-41C4-8C26-91A7E3BB93DC}" type="slidenum">
+              <a:rPr lang="en-US" smtClean="0"/>
+              <a:t>23</a:t>
             </a:fld>
             <a:endParaRPr lang="en-US" dirty="0"/>
           </a:p>
@@ -21401,46 +21571,6 @@
           <a:bodyPr/>
           <a:lstStyle/>
           <a:p>
-            <a:pPr marL="342900" indent="-342900">
-              <a:buFont typeface="Arial" panose="020B0604020202020204" pitchFamily="34" charset="0"/>
-              <a:buChar char="•"/>
-            </a:pPr>
-            <a:r>
-              <a:rPr lang="en-US" sz="1200" dirty="0"/>
-              <a:t>Learning Type – Supervised, Unsupervised</a:t>
-            </a:r>
-          </a:p>
-          <a:p>
-            <a:pPr marL="342900" indent="-342900">
-              <a:buFont typeface="Arial" panose="020B0604020202020204" pitchFamily="34" charset="0"/>
-              <a:buChar char="•"/>
-            </a:pPr>
-            <a:r>
-              <a:rPr lang="en-US" sz="1200" dirty="0"/>
-              <a:t>Result Type – Classification, Regression</a:t>
-            </a:r>
-          </a:p>
-          <a:p>
-            <a:pPr marL="342900" indent="-342900">
-              <a:buFont typeface="Arial" panose="020B0604020202020204" pitchFamily="34" charset="0"/>
-              <a:buChar char="•"/>
-            </a:pPr>
-            <a:r>
-              <a:rPr lang="en-US" sz="1200" dirty="0"/>
-              <a:t>Complexity of the algorithm</a:t>
-            </a:r>
-          </a:p>
-          <a:p>
-            <a:pPr marL="342900" indent="-342900">
-              <a:buFont typeface="Arial" panose="020B0604020202020204" pitchFamily="34" charset="0"/>
-              <a:buChar char="•"/>
-            </a:pPr>
-            <a:r>
-              <a:rPr lang="en-US" sz="1200" dirty="0"/>
-              <a:t>Basic Vs Enhancement</a:t>
-            </a:r>
-          </a:p>
-          <a:p>
             <a:endParaRPr lang="en-US" dirty="0"/>
           </a:p>
         </p:txBody>
@@ -21471,7 +21601,7 @@
     </p:spTree>
     <p:extLst>
       <p:ext uri="{BB962C8B-B14F-4D97-AF65-F5344CB8AC3E}">
-        <p14:creationId xmlns:p14="http://schemas.microsoft.com/office/powerpoint/2010/main" val="3573156617"/>
+        <p14:creationId xmlns:p14="http://schemas.microsoft.com/office/powerpoint/2010/main" val="2912798142"/>
       </p:ext>
     </p:extLst>
   </p:cSld>
@@ -21482,6 +21612,90 @@
 </file>
 
 <file path=ppt/notesSlides/notesSlide4.xml><?xml version="1.0" encoding="utf-8"?>
+<p:notes xmlns:a="http://schemas.openxmlformats.org/drawingml/2006/main" xmlns:r="http://schemas.openxmlformats.org/officeDocument/2006/relationships" xmlns:p="http://schemas.openxmlformats.org/presentationml/2006/main">
+  <p:cSld>
+    <p:spTree>
+      <p:nvGrpSpPr>
+        <p:cNvPr id="1" name=""/>
+        <p:cNvGrpSpPr/>
+        <p:nvPr/>
+      </p:nvGrpSpPr>
+      <p:grpSpPr>
+        <a:xfrm>
+          <a:off x="0" y="0"/>
+          <a:ext cx="0" cy="0"/>
+          <a:chOff x="0" y="0"/>
+          <a:chExt cx="0" cy="0"/>
+        </a:xfrm>
+      </p:grpSpPr>
+      <p:sp>
+        <p:nvSpPr>
+          <p:cNvPr id="2" name="Slide Image Placeholder 1"/>
+          <p:cNvSpPr>
+            <a:spLocks noGrp="1" noRot="1" noChangeAspect="1"/>
+          </p:cNvSpPr>
+          <p:nvPr>
+            <p:ph type="sldImg"/>
+          </p:nvPr>
+        </p:nvSpPr>
+        <p:spPr/>
+      </p:sp>
+      <p:sp>
+        <p:nvSpPr>
+          <p:cNvPr id="3" name="Notes Placeholder 2"/>
+          <p:cNvSpPr>
+            <a:spLocks noGrp="1"/>
+          </p:cNvSpPr>
+          <p:nvPr>
+            <p:ph type="body" idx="1"/>
+          </p:nvPr>
+        </p:nvSpPr>
+        <p:spPr/>
+        <p:txBody>
+          <a:bodyPr/>
+          <a:lstStyle/>
+          <a:p>
+            <a:endParaRPr lang="en-US" dirty="0"/>
+          </a:p>
+        </p:txBody>
+      </p:sp>
+      <p:sp>
+        <p:nvSpPr>
+          <p:cNvPr id="4" name="Slide Number Placeholder 3"/>
+          <p:cNvSpPr>
+            <a:spLocks noGrp="1"/>
+          </p:cNvSpPr>
+          <p:nvPr>
+            <p:ph type="sldNum" sz="quarter" idx="5"/>
+          </p:nvPr>
+        </p:nvSpPr>
+        <p:spPr/>
+        <p:txBody>
+          <a:bodyPr/>
+          <a:lstStyle/>
+          <a:p>
+            <a:fld id="{CD3F15BC-4AA1-41C4-8C26-91A7E3BB93DC}" type="slidenum">
+              <a:rPr lang="en-US" smtClean="0"/>
+              <a:t>7</a:t>
+            </a:fld>
+            <a:endParaRPr lang="en-US" dirty="0"/>
+          </a:p>
+        </p:txBody>
+      </p:sp>
+    </p:spTree>
+    <p:extLst>
+      <p:ext uri="{BB962C8B-B14F-4D97-AF65-F5344CB8AC3E}">
+        <p14:creationId xmlns:p14="http://schemas.microsoft.com/office/powerpoint/2010/main" val="1738451927"/>
+      </p:ext>
+    </p:extLst>
+  </p:cSld>
+  <p:clrMapOvr>
+    <a:masterClrMapping/>
+  </p:clrMapOvr>
+</p:notes>
+</file>
+
+<file path=ppt/notesSlides/notesSlide5.xml><?xml version="1.0" encoding="utf-8"?>
 <p:notes xmlns:a="http://schemas.openxmlformats.org/drawingml/2006/main" xmlns:r="http://schemas.openxmlformats.org/officeDocument/2006/relationships" xmlns:p="http://schemas.openxmlformats.org/presentationml/2006/main">
   <p:cSld>
     <p:spTree>
@@ -21595,91 +21809,7 @@
     </p:spTree>
     <p:extLst>
       <p:ext uri="{BB962C8B-B14F-4D97-AF65-F5344CB8AC3E}">
-        <p14:creationId xmlns:p14="http://schemas.microsoft.com/office/powerpoint/2010/main" val="4226694086"/>
-      </p:ext>
-    </p:extLst>
-  </p:cSld>
-  <p:clrMapOvr>
-    <a:masterClrMapping/>
-  </p:clrMapOvr>
-</p:notes>
-</file>
-
-<file path=ppt/notesSlides/notesSlide5.xml><?xml version="1.0" encoding="utf-8"?>
-<p:notes xmlns:a="http://schemas.openxmlformats.org/drawingml/2006/main" xmlns:r="http://schemas.openxmlformats.org/officeDocument/2006/relationships" xmlns:p="http://schemas.openxmlformats.org/presentationml/2006/main">
-  <p:cSld>
-    <p:spTree>
-      <p:nvGrpSpPr>
-        <p:cNvPr id="1" name=""/>
-        <p:cNvGrpSpPr/>
-        <p:nvPr/>
-      </p:nvGrpSpPr>
-      <p:grpSpPr>
-        <a:xfrm>
-          <a:off x="0" y="0"/>
-          <a:ext cx="0" cy="0"/>
-          <a:chOff x="0" y="0"/>
-          <a:chExt cx="0" cy="0"/>
-        </a:xfrm>
-      </p:grpSpPr>
-      <p:sp>
-        <p:nvSpPr>
-          <p:cNvPr id="2" name="Slide Image Placeholder 1"/>
-          <p:cNvSpPr>
-            <a:spLocks noGrp="1" noRot="1" noChangeAspect="1"/>
-          </p:cNvSpPr>
-          <p:nvPr>
-            <p:ph type="sldImg"/>
-          </p:nvPr>
-        </p:nvSpPr>
-        <p:spPr/>
-      </p:sp>
-      <p:sp>
-        <p:nvSpPr>
-          <p:cNvPr id="3" name="Notes Placeholder 2"/>
-          <p:cNvSpPr>
-            <a:spLocks noGrp="1"/>
-          </p:cNvSpPr>
-          <p:nvPr>
-            <p:ph type="body" idx="1"/>
-          </p:nvPr>
-        </p:nvSpPr>
-        <p:spPr/>
-        <p:txBody>
-          <a:bodyPr/>
-          <a:lstStyle/>
-          <a:p>
-            <a:endParaRPr lang="en-US" dirty="0"/>
-          </a:p>
-        </p:txBody>
-      </p:sp>
-      <p:sp>
-        <p:nvSpPr>
-          <p:cNvPr id="4" name="Slide Number Placeholder 3"/>
-          <p:cNvSpPr>
-            <a:spLocks noGrp="1"/>
-          </p:cNvSpPr>
-          <p:nvPr>
-            <p:ph type="sldNum" sz="quarter" idx="5"/>
-          </p:nvPr>
-        </p:nvSpPr>
-        <p:spPr/>
-        <p:txBody>
-          <a:bodyPr/>
-          <a:lstStyle/>
-          <a:p>
-            <a:fld id="{CD3F15BC-4AA1-41C4-8C26-91A7E3BB93DC}" type="slidenum">
-              <a:rPr lang="en-US" smtClean="0"/>
-              <a:t>9</a:t>
-            </a:fld>
-            <a:endParaRPr lang="en-US" dirty="0"/>
-          </a:p>
-        </p:txBody>
-      </p:sp>
-    </p:spTree>
-    <p:extLst>
-      <p:ext uri="{BB962C8B-B14F-4D97-AF65-F5344CB8AC3E}">
-        <p14:creationId xmlns:p14="http://schemas.microsoft.com/office/powerpoint/2010/main" val="617810883"/>
+        <p14:creationId xmlns:p14="http://schemas.microsoft.com/office/powerpoint/2010/main" val="3573156617"/>
       </p:ext>
     </p:extLst>
   </p:cSld>
@@ -21803,7 +21933,7 @@
     </p:spTree>
     <p:extLst>
       <p:ext uri="{BB962C8B-B14F-4D97-AF65-F5344CB8AC3E}">
-        <p14:creationId xmlns:p14="http://schemas.microsoft.com/office/powerpoint/2010/main" val="4023961085"/>
+        <p14:creationId xmlns:p14="http://schemas.microsoft.com/office/powerpoint/2010/main" val="4226694086"/>
       </p:ext>
     </p:extLst>
   </p:cSld>
@@ -21857,6 +21987,46 @@
           <a:bodyPr/>
           <a:lstStyle/>
           <a:p>
+            <a:pPr marL="342900" indent="-342900">
+              <a:buFont typeface="Arial" panose="020B0604020202020204" pitchFamily="34" charset="0"/>
+              <a:buChar char="•"/>
+            </a:pPr>
+            <a:r>
+              <a:rPr lang="en-US" sz="1200" dirty="0"/>
+              <a:t>Learning Type – Supervised, Unsupervised</a:t>
+            </a:r>
+          </a:p>
+          <a:p>
+            <a:pPr marL="342900" indent="-342900">
+              <a:buFont typeface="Arial" panose="020B0604020202020204" pitchFamily="34" charset="0"/>
+              <a:buChar char="•"/>
+            </a:pPr>
+            <a:r>
+              <a:rPr lang="en-US" sz="1200" dirty="0"/>
+              <a:t>Result Type – Classification, Regression</a:t>
+            </a:r>
+          </a:p>
+          <a:p>
+            <a:pPr marL="342900" indent="-342900">
+              <a:buFont typeface="Arial" panose="020B0604020202020204" pitchFamily="34" charset="0"/>
+              <a:buChar char="•"/>
+            </a:pPr>
+            <a:r>
+              <a:rPr lang="en-US" sz="1200" dirty="0"/>
+              <a:t>Complexity of the algorithm</a:t>
+            </a:r>
+          </a:p>
+          <a:p>
+            <a:pPr marL="342900" indent="-342900">
+              <a:buFont typeface="Arial" panose="020B0604020202020204" pitchFamily="34" charset="0"/>
+              <a:buChar char="•"/>
+            </a:pPr>
+            <a:r>
+              <a:rPr lang="en-US" sz="1200" dirty="0"/>
+              <a:t>Basic Vs Enhancement</a:t>
+            </a:r>
+          </a:p>
+          <a:p>
             <a:endParaRPr lang="en-US" dirty="0"/>
           </a:p>
         </p:txBody>
@@ -21878,7 +22048,7 @@
           <a:p>
             <a:fld id="{CD3F15BC-4AA1-41C4-8C26-91A7E3BB93DC}" type="slidenum">
               <a:rPr lang="en-US" smtClean="0"/>
-              <a:t>17</a:t>
+              <a:t>11</a:t>
             </a:fld>
             <a:endParaRPr lang="en-US" dirty="0"/>
           </a:p>
@@ -21887,7 +22057,7 @@
     </p:spTree>
     <p:extLst>
       <p:ext uri="{BB962C8B-B14F-4D97-AF65-F5344CB8AC3E}">
-        <p14:creationId xmlns:p14="http://schemas.microsoft.com/office/powerpoint/2010/main" val="3669756545"/>
+        <p14:creationId xmlns:p14="http://schemas.microsoft.com/office/powerpoint/2010/main" val="617810883"/>
       </p:ext>
     </p:extLst>
   </p:cSld>
@@ -21962,7 +22132,7 @@
           <a:p>
             <a:fld id="{CD3F15BC-4AA1-41C4-8C26-91A7E3BB93DC}" type="slidenum">
               <a:rPr lang="en-US" smtClean="0"/>
-              <a:t>18</a:t>
+              <a:t>12</a:t>
             </a:fld>
             <a:endParaRPr lang="en-US" dirty="0"/>
           </a:p>
@@ -21971,7 +22141,7 @@
     </p:spTree>
     <p:extLst>
       <p:ext uri="{BB962C8B-B14F-4D97-AF65-F5344CB8AC3E}">
-        <p14:creationId xmlns:p14="http://schemas.microsoft.com/office/powerpoint/2010/main" val="1738381787"/>
+        <p14:creationId xmlns:p14="http://schemas.microsoft.com/office/powerpoint/2010/main" val="4023961085"/>
       </p:ext>
     </p:extLst>
   </p:cSld>
@@ -22055,7 +22225,7 @@
     </p:spTree>
     <p:extLst>
       <p:ext uri="{BB962C8B-B14F-4D97-AF65-F5344CB8AC3E}">
-        <p14:creationId xmlns:p14="http://schemas.microsoft.com/office/powerpoint/2010/main" val="1667354985"/>
+        <p14:creationId xmlns:p14="http://schemas.microsoft.com/office/powerpoint/2010/main" val="3669756545"/>
       </p:ext>
     </p:extLst>
   </p:cSld>
@@ -22311,7 +22481,7 @@
             <a:fld id="{B61BEF0D-F0BB-DE4B-95CE-6DB70DBA9567}" type="datetimeFigureOut">
               <a:rPr lang="en-US" smtClean="0"/>
               <a:pPr/>
-              <a:t>10/29/2019</a:t>
+              <a:t>10/30/2019</a:t>
             </a:fld>
             <a:endParaRPr lang="en-US" dirty="0"/>
           </a:p>
@@ -22575,7 +22745,7 @@
             <a:fld id="{B61BEF0D-F0BB-DE4B-95CE-6DB70DBA9567}" type="datetimeFigureOut">
               <a:rPr lang="en-US" smtClean="0"/>
               <a:pPr/>
-              <a:t>10/29/2019</a:t>
+              <a:t>10/30/2019</a:t>
             </a:fld>
             <a:endParaRPr lang="en-US" dirty="0"/>
           </a:p>
@@ -22812,7 +22982,7 @@
             <a:fld id="{B61BEF0D-F0BB-DE4B-95CE-6DB70DBA9567}" type="datetimeFigureOut">
               <a:rPr lang="en-US" smtClean="0"/>
               <a:pPr/>
-              <a:t>10/29/2019</a:t>
+              <a:t>10/30/2019</a:t>
             </a:fld>
             <a:endParaRPr lang="en-US" dirty="0"/>
           </a:p>
@@ -23054,7 +23224,7 @@
             <a:fld id="{B61BEF0D-F0BB-DE4B-95CE-6DB70DBA9567}" type="datetimeFigureOut">
               <a:rPr lang="en-US" smtClean="0"/>
               <a:pPr/>
-              <a:t>10/29/2019</a:t>
+              <a:t>10/30/2019</a:t>
             </a:fld>
             <a:endParaRPr lang="en-US" dirty="0"/>
           </a:p>
@@ -23363,7 +23533,7 @@
             <a:fld id="{B61BEF0D-F0BB-DE4B-95CE-6DB70DBA9567}" type="datetimeFigureOut">
               <a:rPr lang="en-US" smtClean="0"/>
               <a:pPr/>
-              <a:t>10/29/2019</a:t>
+              <a:t>10/30/2019</a:t>
             </a:fld>
             <a:endParaRPr lang="en-US" dirty="0"/>
           </a:p>
@@ -23667,7 +23837,7 @@
             <a:fld id="{B61BEF0D-F0BB-DE4B-95CE-6DB70DBA9567}" type="datetimeFigureOut">
               <a:rPr lang="en-US" smtClean="0"/>
               <a:pPr/>
-              <a:t>10/29/2019</a:t>
+              <a:t>10/30/2019</a:t>
             </a:fld>
             <a:endParaRPr lang="en-US" dirty="0"/>
           </a:p>
@@ -24091,7 +24261,7 @@
             <a:fld id="{B61BEF0D-F0BB-DE4B-95CE-6DB70DBA9567}" type="datetimeFigureOut">
               <a:rPr lang="en-US" smtClean="0"/>
               <a:pPr/>
-              <a:t>10/29/2019</a:t>
+              <a:t>10/30/2019</a:t>
             </a:fld>
             <a:endParaRPr lang="en-US" dirty="0"/>
           </a:p>
@@ -24188,7 +24358,7 @@
             <a:fld id="{B61BEF0D-F0BB-DE4B-95CE-6DB70DBA9567}" type="datetimeFigureOut">
               <a:rPr lang="en-US" smtClean="0"/>
               <a:pPr/>
-              <a:t>10/29/2019</a:t>
+              <a:t>10/30/2019</a:t>
             </a:fld>
             <a:endParaRPr lang="en-US" dirty="0"/>
           </a:p>
@@ -24352,7 +24522,7 @@
             <a:fld id="{B61BEF0D-F0BB-DE4B-95CE-6DB70DBA9567}" type="datetimeFigureOut">
               <a:rPr lang="en-US" smtClean="0"/>
               <a:pPr/>
-              <a:t>10/29/2019</a:t>
+              <a:t>10/30/2019</a:t>
             </a:fld>
             <a:endParaRPr lang="en-US" dirty="0"/>
           </a:p>
@@ -24732,7 +24902,7 @@
             <a:fld id="{B61BEF0D-F0BB-DE4B-95CE-6DB70DBA9567}" type="datetimeFigureOut">
               <a:rPr lang="en-US" smtClean="0"/>
               <a:pPr/>
-              <a:t>10/29/2019</a:t>
+              <a:t>10/30/2019</a:t>
             </a:fld>
             <a:endParaRPr lang="en-US" dirty="0"/>
           </a:p>
@@ -25023,7 +25193,7 @@
             <a:fld id="{B61BEF0D-F0BB-DE4B-95CE-6DB70DBA9567}" type="datetimeFigureOut">
               <a:rPr lang="en-US" smtClean="0"/>
               <a:pPr/>
-              <a:t>10/29/2019</a:t>
+              <a:t>10/30/2019</a:t>
             </a:fld>
             <a:endParaRPr lang="en-US" dirty="0"/>
           </a:p>
@@ -25236,7 +25406,7 @@
             <a:fld id="{B61BEF0D-F0BB-DE4B-95CE-6DB70DBA9567}" type="datetimeFigureOut">
               <a:rPr lang="en-US" smtClean="0"/>
               <a:pPr/>
-              <a:t>10/29/2019</a:t>
+              <a:t>10/30/2019</a:t>
             </a:fld>
             <a:endParaRPr lang="en-US" dirty="0"/>
           </a:p>
@@ -26547,6 +26717,570 @@
     </p:spTree>
     <p:extLst>
       <p:ext uri="{BB962C8B-B14F-4D97-AF65-F5344CB8AC3E}">
+        <p14:creationId xmlns:p14="http://schemas.microsoft.com/office/powerpoint/2010/main" val="1060920759"/>
+      </p:ext>
+    </p:extLst>
+  </p:cSld>
+  <p:clrMapOvr>
+    <a:masterClrMapping/>
+  </p:clrMapOvr>
+</p:sld>
+</file>
+
+<file path=ppt/slides/slide11.xml><?xml version="1.0" encoding="utf-8"?>
+<p:sld xmlns:a="http://schemas.openxmlformats.org/drawingml/2006/main" xmlns:r="http://schemas.openxmlformats.org/officeDocument/2006/relationships" xmlns:p="http://schemas.openxmlformats.org/presentationml/2006/main">
+  <p:cSld>
+    <p:spTree>
+      <p:nvGrpSpPr>
+        <p:cNvPr id="1" name=""/>
+        <p:cNvGrpSpPr/>
+        <p:nvPr/>
+      </p:nvGrpSpPr>
+      <p:grpSpPr>
+        <a:xfrm>
+          <a:off x="0" y="0"/>
+          <a:ext cx="0" cy="0"/>
+          <a:chOff x="0" y="0"/>
+          <a:chExt cx="0" cy="0"/>
+        </a:xfrm>
+      </p:grpSpPr>
+      <p:sp>
+        <p:nvSpPr>
+          <p:cNvPr id="2" name="Title 1">
+            <a:extLst>
+              <a:ext uri="{FF2B5EF4-FFF2-40B4-BE49-F238E27FC236}">
+                <a16:creationId xmlns:a16="http://schemas.microsoft.com/office/drawing/2014/main" id="{5B040558-A365-4CCE-92FA-5A48CD98F9C9}"/>
+              </a:ext>
+            </a:extLst>
+          </p:cNvPr>
+          <p:cNvSpPr>
+            <a:spLocks noGrp="1"/>
+          </p:cNvSpPr>
+          <p:nvPr>
+            <p:ph type="title"/>
+          </p:nvPr>
+        </p:nvSpPr>
+        <p:spPr>
+          <a:xfrm>
+            <a:off x="581192" y="702156"/>
+            <a:ext cx="11029616" cy="1013800"/>
+          </a:xfrm>
+        </p:spPr>
+        <p:txBody>
+          <a:bodyPr>
+            <a:normAutofit/>
+          </a:bodyPr>
+          <a:lstStyle/>
+          <a:p>
+            <a:r>
+              <a:rPr lang="en-US" sz="2800">
+                <a:solidFill>
+                  <a:srgbClr val="FFFEFF"/>
+                </a:solidFill>
+              </a:rPr>
+              <a:t>Machine learning workflow</a:t>
+            </a:r>
+          </a:p>
+        </p:txBody>
+      </p:sp>
+      <p:graphicFrame>
+        <p:nvGraphicFramePr>
+          <p:cNvPr id="26" name="Content Placeholder 3" descr="icon SmartArt graphic">
+            <a:extLst>
+              <a:ext uri="{FF2B5EF4-FFF2-40B4-BE49-F238E27FC236}">
+                <a16:creationId xmlns:a16="http://schemas.microsoft.com/office/drawing/2014/main" id="{81E592E1-99DF-4294-A2E9-EF46299BD3F4}"/>
+              </a:ext>
+            </a:extLst>
+          </p:cNvPr>
+          <p:cNvGraphicFramePr>
+            <a:graphicFrameLocks noGrp="1"/>
+          </p:cNvGraphicFramePr>
+          <p:nvPr>
+            <p:ph idx="4294967295"/>
+            <p:extLst>
+              <p:ext uri="{D42A27DB-BD31-4B8C-83A1-F6EECF244321}">
+                <p14:modId xmlns:p14="http://schemas.microsoft.com/office/powerpoint/2010/main" val="2948299104"/>
+              </p:ext>
+            </p:extLst>
+          </p:nvPr>
+        </p:nvGraphicFramePr>
+        <p:xfrm>
+          <a:off x="581025" y="2181225"/>
+          <a:ext cx="4339558" cy="3678238"/>
+        </p:xfrm>
+        <a:graphic>
+          <a:graphicData uri="http://schemas.openxmlformats.org/drawingml/2006/diagram">
+            <dgm:relIds xmlns:dgm="http://schemas.openxmlformats.org/drawingml/2006/diagram" xmlns:r="http://schemas.openxmlformats.org/officeDocument/2006/relationships" r:dm="rId3" r:lo="rId4" r:qs="rId5" r:cs="rId6"/>
+          </a:graphicData>
+        </a:graphic>
+      </p:graphicFrame>
+      <p:sp>
+        <p:nvSpPr>
+          <p:cNvPr id="5" name="TextBox 4">
+            <a:extLst>
+              <a:ext uri="{FF2B5EF4-FFF2-40B4-BE49-F238E27FC236}">
+                <a16:creationId xmlns:a16="http://schemas.microsoft.com/office/drawing/2014/main" id="{E70F6769-B81F-4D31-B679-B02EE3C2198A}"/>
+              </a:ext>
+            </a:extLst>
+          </p:cNvPr>
+          <p:cNvSpPr txBox="1"/>
+          <p:nvPr/>
+        </p:nvSpPr>
+        <p:spPr>
+          <a:xfrm>
+            <a:off x="4920583" y="2723121"/>
+            <a:ext cx="5693529" cy="2194447"/>
+          </a:xfrm>
+          <a:prstGeom prst="rect">
+            <a:avLst/>
+          </a:prstGeom>
+          <a:noFill/>
+        </p:spPr>
+        <p:txBody>
+          <a:bodyPr wrap="square" rtlCol="0">
+            <a:spAutoFit/>
+          </a:bodyPr>
+          <a:lstStyle/>
+          <a:p>
+            <a:pPr marL="630000" lvl="1" indent="-306000">
+              <a:lnSpc>
+                <a:spcPct val="80000"/>
+              </a:lnSpc>
+              <a:spcBef>
+                <a:spcPct val="20000"/>
+              </a:spcBef>
+              <a:spcAft>
+                <a:spcPts val="600"/>
+              </a:spcAft>
+              <a:buClr>
+                <a:schemeClr val="accent2"/>
+              </a:buClr>
+              <a:buSzPct val="92000"/>
+              <a:buFont typeface="Wingdings 2" panose="05020102010507070707" pitchFamily="18" charset="2"/>
+              <a:buChar char=""/>
+            </a:pPr>
+            <a:r>
+              <a:rPr lang="en-US" sz="3200" dirty="0">
+                <a:solidFill>
+                  <a:schemeClr val="tx2"/>
+                </a:solidFill>
+                <a:latin typeface="Times New Roman" panose="02020603050405020304" pitchFamily="18" charset="0"/>
+                <a:cs typeface="Times New Roman" panose="02020603050405020304" pitchFamily="18" charset="0"/>
+              </a:rPr>
+              <a:t>Naïve Bayes</a:t>
+            </a:r>
+          </a:p>
+          <a:p>
+            <a:pPr marL="630000" lvl="1" indent="-306000">
+              <a:lnSpc>
+                <a:spcPct val="80000"/>
+              </a:lnSpc>
+              <a:spcBef>
+                <a:spcPct val="20000"/>
+              </a:spcBef>
+              <a:spcAft>
+                <a:spcPts val="600"/>
+              </a:spcAft>
+              <a:buClr>
+                <a:schemeClr val="accent2"/>
+              </a:buClr>
+              <a:buSzPct val="92000"/>
+              <a:buFont typeface="Wingdings 2" panose="05020102010507070707" pitchFamily="18" charset="2"/>
+              <a:buChar char=""/>
+            </a:pPr>
+            <a:r>
+              <a:rPr lang="en-US" sz="3200" dirty="0">
+                <a:solidFill>
+                  <a:schemeClr val="tx2"/>
+                </a:solidFill>
+                <a:latin typeface="Times New Roman" panose="02020603050405020304" pitchFamily="18" charset="0"/>
+                <a:cs typeface="Times New Roman" panose="02020603050405020304" pitchFamily="18" charset="0"/>
+              </a:rPr>
+              <a:t>Random Forest</a:t>
+            </a:r>
+          </a:p>
+          <a:p>
+            <a:pPr marL="630000" lvl="1" indent="-306000">
+              <a:lnSpc>
+                <a:spcPct val="80000"/>
+              </a:lnSpc>
+              <a:spcBef>
+                <a:spcPct val="20000"/>
+              </a:spcBef>
+              <a:spcAft>
+                <a:spcPts val="600"/>
+              </a:spcAft>
+              <a:buClr>
+                <a:schemeClr val="accent2"/>
+              </a:buClr>
+              <a:buSzPct val="92000"/>
+              <a:buFont typeface="Wingdings 2" panose="05020102010507070707" pitchFamily="18" charset="2"/>
+              <a:buChar char=""/>
+            </a:pPr>
+            <a:r>
+              <a:rPr lang="en-US" sz="3200" dirty="0">
+                <a:solidFill>
+                  <a:schemeClr val="tx2"/>
+                </a:solidFill>
+                <a:latin typeface="Times New Roman" panose="02020603050405020304" pitchFamily="18" charset="0"/>
+                <a:cs typeface="Times New Roman" panose="02020603050405020304" pitchFamily="18" charset="0"/>
+              </a:rPr>
+              <a:t>Decision Tree</a:t>
+            </a:r>
+          </a:p>
+          <a:p>
+            <a:pPr marL="630000" lvl="1" indent="-306000">
+              <a:lnSpc>
+                <a:spcPct val="80000"/>
+              </a:lnSpc>
+              <a:spcBef>
+                <a:spcPct val="20000"/>
+              </a:spcBef>
+              <a:spcAft>
+                <a:spcPts val="600"/>
+              </a:spcAft>
+              <a:buClr>
+                <a:schemeClr val="accent2"/>
+              </a:buClr>
+              <a:buSzPct val="92000"/>
+              <a:buFont typeface="Wingdings 2" panose="05020102010507070707" pitchFamily="18" charset="2"/>
+              <a:buChar char=""/>
+            </a:pPr>
+            <a:r>
+              <a:rPr lang="en-US" sz="3200" dirty="0">
+                <a:solidFill>
+                  <a:schemeClr val="tx2"/>
+                </a:solidFill>
+                <a:latin typeface="Times New Roman" panose="02020603050405020304" pitchFamily="18" charset="0"/>
+                <a:cs typeface="Times New Roman" panose="02020603050405020304" pitchFamily="18" charset="0"/>
+              </a:rPr>
+              <a:t>Logistic Regression</a:t>
+            </a:r>
+          </a:p>
+        </p:txBody>
+      </p:sp>
+    </p:spTree>
+    <p:extLst>
+      <p:ext uri="{BB962C8B-B14F-4D97-AF65-F5344CB8AC3E}">
+        <p14:creationId xmlns:p14="http://schemas.microsoft.com/office/powerpoint/2010/main" val="2788682890"/>
+      </p:ext>
+    </p:extLst>
+  </p:cSld>
+  <p:clrMapOvr>
+    <a:masterClrMapping/>
+  </p:clrMapOvr>
+</p:sld>
+</file>
+
+<file path=ppt/slides/slide12.xml><?xml version="1.0" encoding="utf-8"?>
+<p:sld xmlns:a="http://schemas.openxmlformats.org/drawingml/2006/main" xmlns:r="http://schemas.openxmlformats.org/officeDocument/2006/relationships" xmlns:p="http://schemas.openxmlformats.org/presentationml/2006/main">
+  <p:cSld>
+    <p:bg>
+      <p:bgPr>
+        <a:solidFill>
+          <a:schemeClr val="bg1"/>
+        </a:solidFill>
+        <a:effectLst/>
+      </p:bgPr>
+    </p:bg>
+    <p:spTree>
+      <p:nvGrpSpPr>
+        <p:cNvPr id="1" name=""/>
+        <p:cNvGrpSpPr/>
+        <p:nvPr/>
+      </p:nvGrpSpPr>
+      <p:grpSpPr>
+        <a:xfrm>
+          <a:off x="0" y="0"/>
+          <a:ext cx="0" cy="0"/>
+          <a:chOff x="0" y="0"/>
+          <a:chExt cx="0" cy="0"/>
+        </a:xfrm>
+      </p:grpSpPr>
+      <p:sp>
+        <p:nvSpPr>
+          <p:cNvPr id="2" name="Title 1">
+            <a:extLst>
+              <a:ext uri="{FF2B5EF4-FFF2-40B4-BE49-F238E27FC236}">
+                <a16:creationId xmlns:a16="http://schemas.microsoft.com/office/drawing/2014/main" id="{5B040558-A365-4CCE-92FA-5A48CD98F9C9}"/>
+              </a:ext>
+            </a:extLst>
+          </p:cNvPr>
+          <p:cNvSpPr>
+            <a:spLocks noGrp="1"/>
+          </p:cNvSpPr>
+          <p:nvPr>
+            <p:ph type="title"/>
+          </p:nvPr>
+        </p:nvSpPr>
+        <p:spPr>
+          <a:xfrm>
+            <a:off x="581192" y="702156"/>
+            <a:ext cx="11029616" cy="1013800"/>
+          </a:xfrm>
+        </p:spPr>
+        <p:txBody>
+          <a:bodyPr>
+            <a:normAutofit/>
+          </a:bodyPr>
+          <a:lstStyle/>
+          <a:p>
+            <a:r>
+              <a:rPr lang="en-US" sz="2800">
+                <a:solidFill>
+                  <a:srgbClr val="FFFEFF"/>
+                </a:solidFill>
+              </a:rPr>
+              <a:t>Machine learning workflow</a:t>
+            </a:r>
+          </a:p>
+        </p:txBody>
+      </p:sp>
+      <p:graphicFrame>
+        <p:nvGraphicFramePr>
+          <p:cNvPr id="26" name="Content Placeholder 3" descr="icon SmartArt graphic">
+            <a:extLst>
+              <a:ext uri="{FF2B5EF4-FFF2-40B4-BE49-F238E27FC236}">
+                <a16:creationId xmlns:a16="http://schemas.microsoft.com/office/drawing/2014/main" id="{81E592E1-99DF-4294-A2E9-EF46299BD3F4}"/>
+              </a:ext>
+            </a:extLst>
+          </p:cNvPr>
+          <p:cNvGraphicFramePr>
+            <a:graphicFrameLocks noGrp="1"/>
+          </p:cNvGraphicFramePr>
+          <p:nvPr>
+            <p:ph idx="4294967295"/>
+          </p:nvPr>
+        </p:nvGraphicFramePr>
+        <p:xfrm>
+          <a:off x="535558" y="2181225"/>
+          <a:ext cx="11029950" cy="3678238"/>
+        </p:xfrm>
+        <a:graphic>
+          <a:graphicData uri="http://schemas.openxmlformats.org/drawingml/2006/diagram">
+            <dgm:relIds xmlns:dgm="http://schemas.openxmlformats.org/drawingml/2006/diagram" xmlns:r="http://schemas.openxmlformats.org/officeDocument/2006/relationships" r:dm="rId3" r:lo="rId4" r:qs="rId5" r:cs="rId6"/>
+          </a:graphicData>
+        </a:graphic>
+      </p:graphicFrame>
+      <p:sp>
+        <p:nvSpPr>
+          <p:cNvPr id="29" name="Arrow: Right 28">
+            <a:extLst>
+              <a:ext uri="{FF2B5EF4-FFF2-40B4-BE49-F238E27FC236}">
+                <a16:creationId xmlns:a16="http://schemas.microsoft.com/office/drawing/2014/main" id="{36F11D05-2C77-4974-B7BB-ECEEAC258A39}"/>
+              </a:ext>
+            </a:extLst>
+          </p:cNvPr>
+          <p:cNvSpPr/>
+          <p:nvPr/>
+        </p:nvSpPr>
+        <p:spPr>
+          <a:xfrm>
+            <a:off x="4863880" y="3307500"/>
+            <a:ext cx="261596" cy="243000"/>
+          </a:xfrm>
+          <a:prstGeom prst="rightArrow">
+            <a:avLst>
+              <a:gd name="adj1" fmla="val 50000"/>
+              <a:gd name="adj2" fmla="val 50000"/>
+            </a:avLst>
+          </a:prstGeom>
+        </p:spPr>
+        <p:style>
+          <a:lnRef idx="0">
+            <a:schemeClr val="lt1">
+              <a:hueOff val="0"/>
+              <a:satOff val="0"/>
+              <a:lumOff val="0"/>
+              <a:alphaOff val="0"/>
+            </a:schemeClr>
+          </a:lnRef>
+          <a:fillRef idx="3">
+            <a:schemeClr val="accent3">
+              <a:hueOff val="0"/>
+              <a:satOff val="0"/>
+              <a:lumOff val="0"/>
+              <a:alphaOff val="0"/>
+            </a:schemeClr>
+          </a:fillRef>
+          <a:effectRef idx="2">
+            <a:schemeClr val="accent3">
+              <a:hueOff val="0"/>
+              <a:satOff val="0"/>
+              <a:lumOff val="0"/>
+              <a:alphaOff val="0"/>
+            </a:schemeClr>
+          </a:effectRef>
+          <a:fontRef idx="minor">
+            <a:schemeClr val="lt1"/>
+          </a:fontRef>
+        </p:style>
+      </p:sp>
+      <p:sp>
+        <p:nvSpPr>
+          <p:cNvPr id="33" name="Arrow: Right 32">
+            <a:extLst>
+              <a:ext uri="{FF2B5EF4-FFF2-40B4-BE49-F238E27FC236}">
+                <a16:creationId xmlns:a16="http://schemas.microsoft.com/office/drawing/2014/main" id="{6FC6D7CB-3AE7-41F7-93F6-A6426CBB1BFB}"/>
+              </a:ext>
+            </a:extLst>
+          </p:cNvPr>
+          <p:cNvSpPr/>
+          <p:nvPr/>
+        </p:nvSpPr>
+        <p:spPr>
+          <a:xfrm>
+            <a:off x="2737858" y="3343706"/>
+            <a:ext cx="261596" cy="243000"/>
+          </a:xfrm>
+          <a:prstGeom prst="rightArrow">
+            <a:avLst>
+              <a:gd name="adj1" fmla="val 50000"/>
+              <a:gd name="adj2" fmla="val 50000"/>
+            </a:avLst>
+          </a:prstGeom>
+        </p:spPr>
+        <p:style>
+          <a:lnRef idx="0">
+            <a:schemeClr val="lt1">
+              <a:hueOff val="0"/>
+              <a:satOff val="0"/>
+              <a:lumOff val="0"/>
+              <a:alphaOff val="0"/>
+            </a:schemeClr>
+          </a:lnRef>
+          <a:fillRef idx="3">
+            <a:schemeClr val="accent3">
+              <a:hueOff val="0"/>
+              <a:satOff val="0"/>
+              <a:lumOff val="0"/>
+              <a:alphaOff val="0"/>
+            </a:schemeClr>
+          </a:fillRef>
+          <a:effectRef idx="2">
+            <a:schemeClr val="accent3">
+              <a:hueOff val="0"/>
+              <a:satOff val="0"/>
+              <a:lumOff val="0"/>
+              <a:alphaOff val="0"/>
+            </a:schemeClr>
+          </a:effectRef>
+          <a:fontRef idx="minor">
+            <a:schemeClr val="lt1"/>
+          </a:fontRef>
+        </p:style>
+      </p:sp>
+      <p:sp>
+        <p:nvSpPr>
+          <p:cNvPr id="34" name="Arrow: Right 33">
+            <a:extLst>
+              <a:ext uri="{FF2B5EF4-FFF2-40B4-BE49-F238E27FC236}">
+                <a16:creationId xmlns:a16="http://schemas.microsoft.com/office/drawing/2014/main" id="{B4920B7A-0E5E-4517-AA7C-70EF8EFE25F6}"/>
+              </a:ext>
+            </a:extLst>
+          </p:cNvPr>
+          <p:cNvSpPr/>
+          <p:nvPr/>
+        </p:nvSpPr>
+        <p:spPr>
+          <a:xfrm>
+            <a:off x="6993217" y="3296387"/>
+            <a:ext cx="261596" cy="243000"/>
+          </a:xfrm>
+          <a:prstGeom prst="rightArrow">
+            <a:avLst>
+              <a:gd name="adj1" fmla="val 50000"/>
+              <a:gd name="adj2" fmla="val 50000"/>
+            </a:avLst>
+          </a:prstGeom>
+        </p:spPr>
+        <p:style>
+          <a:lnRef idx="0">
+            <a:schemeClr val="lt1">
+              <a:hueOff val="0"/>
+              <a:satOff val="0"/>
+              <a:lumOff val="0"/>
+              <a:alphaOff val="0"/>
+            </a:schemeClr>
+          </a:lnRef>
+          <a:fillRef idx="3">
+            <a:schemeClr val="accent3">
+              <a:hueOff val="0"/>
+              <a:satOff val="0"/>
+              <a:lumOff val="0"/>
+              <a:alphaOff val="0"/>
+            </a:schemeClr>
+          </a:fillRef>
+          <a:effectRef idx="2">
+            <a:schemeClr val="accent3">
+              <a:hueOff val="0"/>
+              <a:satOff val="0"/>
+              <a:lumOff val="0"/>
+              <a:alphaOff val="0"/>
+            </a:schemeClr>
+          </a:effectRef>
+          <a:fontRef idx="minor">
+            <a:schemeClr val="lt1"/>
+          </a:fontRef>
+        </p:style>
+      </p:sp>
+      <p:sp>
+        <p:nvSpPr>
+          <p:cNvPr id="35" name="Arrow: Right 34">
+            <a:extLst>
+              <a:ext uri="{FF2B5EF4-FFF2-40B4-BE49-F238E27FC236}">
+                <a16:creationId xmlns:a16="http://schemas.microsoft.com/office/drawing/2014/main" id="{B3A327B9-ADE3-4AD6-ACE4-27C1DAAC679E}"/>
+              </a:ext>
+            </a:extLst>
+          </p:cNvPr>
+          <p:cNvSpPr/>
+          <p:nvPr/>
+        </p:nvSpPr>
+        <p:spPr>
+          <a:xfrm>
+            <a:off x="8991756" y="3232143"/>
+            <a:ext cx="261596" cy="243000"/>
+          </a:xfrm>
+          <a:prstGeom prst="rightArrow">
+            <a:avLst>
+              <a:gd name="adj1" fmla="val 50000"/>
+              <a:gd name="adj2" fmla="val 50000"/>
+            </a:avLst>
+          </a:prstGeom>
+        </p:spPr>
+        <p:style>
+          <a:lnRef idx="0">
+            <a:schemeClr val="lt1">
+              <a:hueOff val="0"/>
+              <a:satOff val="0"/>
+              <a:lumOff val="0"/>
+              <a:alphaOff val="0"/>
+            </a:schemeClr>
+          </a:lnRef>
+          <a:fillRef idx="3">
+            <a:schemeClr val="accent3">
+              <a:hueOff val="0"/>
+              <a:satOff val="0"/>
+              <a:lumOff val="0"/>
+              <a:alphaOff val="0"/>
+            </a:schemeClr>
+          </a:fillRef>
+          <a:effectRef idx="2">
+            <a:schemeClr val="accent3">
+              <a:hueOff val="0"/>
+              <a:satOff val="0"/>
+              <a:lumOff val="0"/>
+              <a:alphaOff val="0"/>
+            </a:schemeClr>
+          </a:effectRef>
+          <a:fontRef idx="minor">
+            <a:schemeClr val="lt1"/>
+          </a:fontRef>
+        </p:style>
+      </p:sp>
+    </p:spTree>
+    <p:extLst>
+      <p:ext uri="{BB962C8B-B14F-4D97-AF65-F5344CB8AC3E}">
         <p14:creationId xmlns:p14="http://schemas.microsoft.com/office/powerpoint/2010/main" val="2152085735"/>
       </p:ext>
     </p:extLst>
@@ -26557,7 +27291,7 @@
 </p:sld>
 </file>
 
-<file path=ppt/slides/slide11.xml><?xml version="1.0" encoding="utf-8"?>
+<file path=ppt/slides/slide13.xml><?xml version="1.0" encoding="utf-8"?>
 <p:sld xmlns:a="http://schemas.openxmlformats.org/drawingml/2006/main" xmlns:r="http://schemas.openxmlformats.org/officeDocument/2006/relationships" xmlns:p="http://schemas.openxmlformats.org/presentationml/2006/main">
   <p:cSld>
     <p:spTree>
@@ -26603,7 +27337,7 @@
           <a:lstStyle/>
           <a:p>
             <a:r>
-              <a:rPr lang="en-US" dirty="0"/>
+              <a:rPr lang="en-US" sz="3100" dirty="0"/>
               <a:t>Naïve Bayes</a:t>
             </a:r>
             <a:br>
@@ -26628,7 +27362,7 @@
         <p:spPr>
           <a:xfrm>
             <a:off x="414478" y="1204980"/>
-            <a:ext cx="10878277" cy="369332"/>
+            <a:ext cx="10878277" cy="461665"/>
           </a:xfrm>
           <a:prstGeom prst="rect">
             <a:avLst/>
@@ -26642,12 +27376,20 @@
           <a:lstStyle/>
           <a:p>
             <a:r>
-              <a:rPr lang="en-US" dirty="0">
+              <a:rPr lang="en-US" sz="2400" b="1" dirty="0">
                 <a:solidFill>
                   <a:schemeClr val="bg1"/>
                 </a:solidFill>
               </a:rPr>
-              <a:t>Features: IUCR, Time of Occurrence, Location (modified Latitude/Longitude)</a:t>
+              <a:t>Features:  </a:t>
+            </a:r>
+            <a:r>
+              <a:rPr lang="en-US" sz="2400" dirty="0">
+                <a:solidFill>
+                  <a:schemeClr val="bg1"/>
+                </a:solidFill>
+              </a:rPr>
+              <a:t>IUCR, Time of Occurrence, Location (modified Latitude/Longitude)</a:t>
             </a:r>
           </a:p>
         </p:txBody>
@@ -26917,14 +27659,14 @@
           <p:nvPr>
             <p:extLst>
               <p:ext uri="{D42A27DB-BD31-4B8C-83A1-F6EECF244321}">
-                <p14:modId xmlns:p14="http://schemas.microsoft.com/office/powerpoint/2010/main" val="491947856"/>
+                <p14:modId xmlns:p14="http://schemas.microsoft.com/office/powerpoint/2010/main" val="2338566421"/>
               </p:ext>
             </p:extLst>
           </p:nvPr>
         </p:nvGraphicFramePr>
         <p:xfrm>
           <a:off x="414478" y="1895978"/>
-          <a:ext cx="5414552" cy="2326166"/>
+          <a:ext cx="5414552" cy="2321194"/>
         </p:xfrm>
         <a:graphic>
           <a:graphicData uri="http://schemas.openxmlformats.org/drawingml/2006/table">
@@ -27019,7 +27761,7 @@
                   </a:ext>
                 </a:extLst>
               </a:tr>
-              <a:tr h="584092">
+              <a:tr h="378127">
                 <a:tc>
                   <a:txBody>
                     <a:bodyPr/>
@@ -27258,7 +28000,7 @@
 </p:sld>
 </file>
 
-<file path=ppt/slides/slide12.xml><?xml version="1.0" encoding="utf-8"?>
+<file path=ppt/slides/slide14.xml><?xml version="1.0" encoding="utf-8"?>
 <p:sld xmlns:a="http://schemas.openxmlformats.org/drawingml/2006/main" xmlns:r="http://schemas.openxmlformats.org/officeDocument/2006/relationships" xmlns:p="http://schemas.openxmlformats.org/presentationml/2006/main">
   <p:cSld>
     <p:spTree>
@@ -27304,7 +28046,7 @@
           <a:lstStyle/>
           <a:p>
             <a:r>
-              <a:rPr lang="en-US" dirty="0"/>
+              <a:rPr lang="en-US" sz="3100" dirty="0"/>
               <a:t>RANDOM FOREST</a:t>
             </a:r>
             <a:br>
@@ -27329,7 +28071,7 @@
         <p:spPr>
           <a:xfrm>
             <a:off x="414478" y="1204980"/>
-            <a:ext cx="10878277" cy="369332"/>
+            <a:ext cx="10878277" cy="461665"/>
           </a:xfrm>
           <a:prstGeom prst="rect">
             <a:avLst/>
@@ -27343,7 +28085,7 @@
           <a:lstStyle/>
           <a:p>
             <a:r>
-              <a:rPr lang="en-US" dirty="0">
+              <a:rPr lang="en-US" sz="2400" dirty="0">
                 <a:solidFill>
                   <a:schemeClr val="bg1"/>
                 </a:solidFill>
@@ -27950,7 +28692,7 @@
 </p:sld>
 </file>
 
-<file path=ppt/slides/slide13.xml><?xml version="1.0" encoding="utf-8"?>
+<file path=ppt/slides/slide15.xml><?xml version="1.0" encoding="utf-8"?>
 <p:sld xmlns:a="http://schemas.openxmlformats.org/drawingml/2006/main" xmlns:r="http://schemas.openxmlformats.org/officeDocument/2006/relationships" xmlns:p="http://schemas.openxmlformats.org/presentationml/2006/main">
   <p:cSld>
     <p:spTree>
@@ -27996,7 +28738,7 @@
           <a:lstStyle/>
           <a:p>
             <a:r>
-              <a:rPr lang="en-US" dirty="0"/>
+              <a:rPr lang="en-US" sz="3100" dirty="0"/>
               <a:t>LOGISTIC REGRESSION</a:t>
             </a:r>
             <a:br>
@@ -28021,7 +28763,7 @@
         <p:spPr>
           <a:xfrm>
             <a:off x="414478" y="1204980"/>
-            <a:ext cx="10878277" cy="369332"/>
+            <a:ext cx="11363044" cy="459757"/>
           </a:xfrm>
           <a:prstGeom prst="rect">
             <a:avLst/>
@@ -28035,7 +28777,7 @@
           <a:lstStyle/>
           <a:p>
             <a:r>
-              <a:rPr lang="en-US" dirty="0">
+              <a:rPr lang="en-US" sz="2400" dirty="0">
                 <a:solidFill>
                   <a:schemeClr val="bg1"/>
                 </a:solidFill>
@@ -28642,7 +29384,7 @@
 </p:sld>
 </file>
 
-<file path=ppt/slides/slide14.xml><?xml version="1.0" encoding="utf-8"?>
+<file path=ppt/slides/slide16.xml><?xml version="1.0" encoding="utf-8"?>
 <p:sld xmlns:a="http://schemas.openxmlformats.org/drawingml/2006/main" xmlns:r="http://schemas.openxmlformats.org/officeDocument/2006/relationships" xmlns:p="http://schemas.openxmlformats.org/presentationml/2006/main">
   <p:cSld>
     <p:spTree>
@@ -28688,7 +29430,7 @@
           <a:lstStyle/>
           <a:p>
             <a:r>
-              <a:rPr lang="en-US" dirty="0"/>
+              <a:rPr lang="en-US" sz="3100" dirty="0"/>
               <a:t>LOGISTIC REGRESSION</a:t>
             </a:r>
             <a:br>
@@ -28713,7 +29455,7 @@
         <p:spPr>
           <a:xfrm>
             <a:off x="414478" y="1204980"/>
-            <a:ext cx="10878277" cy="369332"/>
+            <a:ext cx="11242263" cy="461665"/>
           </a:xfrm>
           <a:prstGeom prst="rect">
             <a:avLst/>
@@ -28727,7 +29469,7 @@
           <a:lstStyle/>
           <a:p>
             <a:r>
-              <a:rPr lang="en-US" dirty="0">
+              <a:rPr lang="en-US" sz="2400" dirty="0">
                 <a:solidFill>
                   <a:schemeClr val="bg1"/>
                 </a:solidFill>
@@ -28993,14 +29735,14 @@
           <p:nvPr>
             <p:extLst>
               <p:ext uri="{D42A27DB-BD31-4B8C-83A1-F6EECF244321}">
-                <p14:modId xmlns:p14="http://schemas.microsoft.com/office/powerpoint/2010/main" val="3069947363"/>
+                <p14:modId xmlns:p14="http://schemas.microsoft.com/office/powerpoint/2010/main" val="2497953534"/>
               </p:ext>
             </p:extLst>
           </p:nvPr>
         </p:nvGraphicFramePr>
         <p:xfrm>
-          <a:off x="414478" y="1895978"/>
-          <a:ext cx="5414552" cy="2326166"/>
+          <a:off x="414477" y="1905048"/>
+          <a:ext cx="5414552" cy="2413146"/>
         </p:xfrm>
         <a:graphic>
           <a:graphicData uri="http://schemas.openxmlformats.org/drawingml/2006/table">
@@ -29038,7 +29780,7 @@
                   </a:extLst>
                 </a:gridCol>
               </a:tblGrid>
-              <a:tr h="584092">
+              <a:tr h="761261">
                 <a:tc>
                   <a:txBody>
                     <a:bodyPr/>
@@ -29095,7 +29837,7 @@
                   </a:ext>
                 </a:extLst>
               </a:tr>
-              <a:tr h="584092">
+              <a:tr h="556735">
                 <a:tc>
                   <a:txBody>
                     <a:bodyPr/>
@@ -29174,7 +29916,7 @@
                   </a:ext>
                 </a:extLst>
               </a:tr>
-              <a:tr h="584092">
+              <a:tr h="556735">
                 <a:tc>
                   <a:txBody>
                     <a:bodyPr/>
@@ -29253,7 +29995,7 @@
                   </a:ext>
                 </a:extLst>
               </a:tr>
-              <a:tr h="517902">
+              <a:tr h="493645">
                 <a:tc>
                   <a:txBody>
                     <a:bodyPr/>
@@ -29334,7 +30076,7 @@
 </p:sld>
 </file>
 
-<file path=ppt/slides/slide15.xml><?xml version="1.0" encoding="utf-8"?>
+<file path=ppt/slides/slide17.xml><?xml version="1.0" encoding="utf-8"?>
 <p:sld xmlns:a="http://schemas.openxmlformats.org/drawingml/2006/main" xmlns:r="http://schemas.openxmlformats.org/officeDocument/2006/relationships" xmlns:p="http://schemas.openxmlformats.org/presentationml/2006/main">
   <p:cSld>
     <p:spTree>
@@ -29369,7 +30111,7 @@
         </p:nvSpPr>
         <p:spPr>
           <a:xfrm>
-            <a:off x="414478" y="745223"/>
+            <a:off x="694018" y="640837"/>
             <a:ext cx="2662149" cy="919514"/>
           </a:xfrm>
         </p:spPr>
@@ -29380,7 +30122,7 @@
           <a:lstStyle/>
           <a:p>
             <a:r>
-              <a:rPr lang="en-US" dirty="0"/>
+              <a:rPr lang="en-US" sz="3100" dirty="0"/>
               <a:t>Naïve Bayes</a:t>
             </a:r>
             <a:br>
@@ -29404,8 +30146,8 @@
         </p:nvSpPr>
         <p:spPr>
           <a:xfrm>
-            <a:off x="414478" y="1204980"/>
-            <a:ext cx="10878277" cy="369332"/>
+            <a:off x="683655" y="1158312"/>
+            <a:ext cx="10878277" cy="523220"/>
           </a:xfrm>
           <a:prstGeom prst="rect">
             <a:avLst/>
@@ -29419,7 +30161,7 @@
           <a:lstStyle/>
           <a:p>
             <a:r>
-              <a:rPr lang="en-US" dirty="0">
+              <a:rPr lang="en-US" sz="2800" dirty="0">
                 <a:solidFill>
                   <a:schemeClr val="bg1"/>
                 </a:solidFill>
@@ -29541,7 +30283,7 @@
           <p:nvPr>
             <p:extLst>
               <p:ext uri="{D42A27DB-BD31-4B8C-83A1-F6EECF244321}">
-                <p14:modId xmlns:p14="http://schemas.microsoft.com/office/powerpoint/2010/main" val="3789166055"/>
+                <p14:modId xmlns:p14="http://schemas.microsoft.com/office/powerpoint/2010/main" val="1267725306"/>
               </p:ext>
             </p:extLst>
           </p:nvPr>
@@ -29621,7 +30363,7 @@
                     <a:p>
                       <a:r>
                         <a:rPr lang="en-US" dirty="0"/>
-                        <a:t>TP/(TP + FP) = 1,113/4,743 = 23.47 percent</a:t>
+                        <a:t>TP/(TP + FP) = 1,113/4,743 = 23.5 percent</a:t>
                       </a:r>
                     </a:p>
                     <a:p>
@@ -29643,7 +30385,7 @@
                     <a:p>
                       <a:r>
                         <a:rPr lang="en-US" dirty="0"/>
-                        <a:t>(TP + TN)/total = (1,113+58,396)/77,032= 77.25 percent</a:t>
+                        <a:t>(TP + TN)/total = (1,113+58,396)/77,032= 77.3 percent</a:t>
                       </a:r>
                     </a:p>
                     <a:p>
@@ -29713,7 +30455,7 @@
 </p:sld>
 </file>
 
-<file path=ppt/slides/slide16.xml><?xml version="1.0" encoding="utf-8"?>
+<file path=ppt/slides/slide18.xml><?xml version="1.0" encoding="utf-8"?>
 <p:sld xmlns:a="http://schemas.openxmlformats.org/drawingml/2006/main" xmlns:r="http://schemas.openxmlformats.org/officeDocument/2006/relationships" xmlns:p="http://schemas.openxmlformats.org/presentationml/2006/main">
   <p:cSld>
     <p:spTree>
@@ -29753,7 +30495,9 @@
           </a:xfrm>
         </p:spPr>
         <p:txBody>
-          <a:bodyPr/>
+          <a:bodyPr>
+            <a:normAutofit/>
+          </a:bodyPr>
           <a:lstStyle/>
           <a:p>
             <a:r>
@@ -29778,7 +30522,7 @@
         <p:spPr>
           <a:xfrm>
             <a:off x="581192" y="1177100"/>
-            <a:ext cx="10878277" cy="369332"/>
+            <a:ext cx="10878277" cy="523220"/>
           </a:xfrm>
           <a:prstGeom prst="rect">
             <a:avLst/>
@@ -29792,7 +30536,7 @@
           <a:lstStyle/>
           <a:p>
             <a:r>
-              <a:rPr lang="en-US" dirty="0">
+              <a:rPr lang="en-US" sz="2800" dirty="0">
                 <a:solidFill>
                   <a:schemeClr val="bg1"/>
                 </a:solidFill>
@@ -29914,7 +30658,7 @@
           <p:nvPr>
             <p:extLst>
               <p:ext uri="{D42A27DB-BD31-4B8C-83A1-F6EECF244321}">
-                <p14:modId xmlns:p14="http://schemas.microsoft.com/office/powerpoint/2010/main" val="2281452392"/>
+                <p14:modId xmlns:p14="http://schemas.microsoft.com/office/powerpoint/2010/main" val="1175198181"/>
               </p:ext>
             </p:extLst>
           </p:nvPr>
@@ -29994,7 +30738,7 @@
                     <a:p>
                       <a:r>
                         <a:rPr lang="en-US" dirty="0"/>
-                        <a:t>TP/(TP + FP) = 7,516/11,198 = 67.11 percent</a:t>
+                        <a:t>TP/(TP + FP) = 7,516/11,198 = 67.1 percent</a:t>
                       </a:r>
                     </a:p>
                     <a:p>
@@ -30086,7 +30830,7 @@
 </p:sld>
 </file>
 
-<file path=ppt/slides/slide17.xml><?xml version="1.0" encoding="utf-8"?>
+<file path=ppt/slides/slide19.xml><?xml version="1.0" encoding="utf-8"?>
 <p:sld xmlns:a="http://schemas.openxmlformats.org/drawingml/2006/main" xmlns:r="http://schemas.openxmlformats.org/officeDocument/2006/relationships" xmlns:p="http://schemas.openxmlformats.org/presentationml/2006/main">
   <p:cSld>
     <p:bg>
@@ -30185,873 +30929,6 @@
     <p:extLst>
       <p:ext uri="{BB962C8B-B14F-4D97-AF65-F5344CB8AC3E}">
         <p14:creationId xmlns:p14="http://schemas.microsoft.com/office/powerpoint/2010/main" val="1843551074"/>
-      </p:ext>
-    </p:extLst>
-  </p:cSld>
-  <p:clrMapOvr>
-    <a:masterClrMapping/>
-  </p:clrMapOvr>
-</p:sld>
-</file>
-
-<file path=ppt/slides/slide18.xml><?xml version="1.0" encoding="utf-8"?>
-<p:sld xmlns:a="http://schemas.openxmlformats.org/drawingml/2006/main" xmlns:r="http://schemas.openxmlformats.org/officeDocument/2006/relationships" xmlns:p="http://schemas.openxmlformats.org/presentationml/2006/main">
-  <p:cSld>
-    <p:bg>
-      <p:bgPr>
-        <a:solidFill>
-          <a:schemeClr val="bg1"/>
-        </a:solidFill>
-        <a:effectLst/>
-      </p:bgPr>
-    </p:bg>
-    <p:spTree>
-      <p:nvGrpSpPr>
-        <p:cNvPr id="1" name=""/>
-        <p:cNvGrpSpPr/>
-        <p:nvPr/>
-      </p:nvGrpSpPr>
-      <p:grpSpPr>
-        <a:xfrm>
-          <a:off x="0" y="0"/>
-          <a:ext cx="0" cy="0"/>
-          <a:chOff x="0" y="0"/>
-          <a:chExt cx="0" cy="0"/>
-        </a:xfrm>
-      </p:grpSpPr>
-      <p:sp useBgFill="1">
-        <p:nvSpPr>
-          <p:cNvPr id="20" name="Rectangle 19">
-            <a:extLst>
-              <a:ext uri="{FF2B5EF4-FFF2-40B4-BE49-F238E27FC236}">
-                <a16:creationId xmlns:a16="http://schemas.microsoft.com/office/drawing/2014/main" id="{C31BEE40-9750-4035-BFC7-0228EE7FE26E}"/>
-              </a:ext>
-              <a:ext uri="{C183D7F6-B498-43B3-948B-1728B52AA6E4}">
-                <adec:decorative xmlns:adec="http://schemas.microsoft.com/office/drawing/2017/decorative" val="1"/>
-              </a:ext>
-            </a:extLst>
-          </p:cNvPr>
-          <p:cNvSpPr>
-            <a:spLocks noGrp="1" noRot="1" noChangeAspect="1" noMove="1" noResize="1" noEditPoints="1" noAdjustHandles="1" noChangeArrowheads="1" noChangeShapeType="1" noTextEdit="1"/>
-          </p:cNvSpPr>
-          <p:nvPr>
-            <p:extLst>
-              <p:ext uri="{386F3935-93C4-4BCD-93E2-E3B085C9AB24}">
-                <p16:designElem xmlns:p16="http://schemas.microsoft.com/office/powerpoint/2015/main" val="1"/>
-              </p:ext>
-            </p:extLst>
-          </p:nvPr>
-        </p:nvSpPr>
-        <p:spPr>
-          <a:xfrm>
-            <a:off x="0" y="0"/>
-            <a:ext cx="12192000" cy="6858000"/>
-          </a:xfrm>
-          <a:prstGeom prst="rect">
-            <a:avLst/>
-          </a:prstGeom>
-          <a:ln>
-            <a:noFill/>
-          </a:ln>
-        </p:spPr>
-        <p:style>
-          <a:lnRef idx="2">
-            <a:schemeClr val="accent1">
-              <a:shade val="50000"/>
-            </a:schemeClr>
-          </a:lnRef>
-          <a:fillRef idx="1">
-            <a:schemeClr val="accent1"/>
-          </a:fillRef>
-          <a:effectRef idx="0">
-            <a:schemeClr val="accent1"/>
-          </a:effectRef>
-          <a:fontRef idx="minor">
-            <a:schemeClr val="lt1"/>
-          </a:fontRef>
-        </p:style>
-        <p:txBody>
-          <a:bodyPr rtlCol="0" anchor="ctr"/>
-          <a:lstStyle/>
-          <a:p>
-            <a:pPr algn="ctr"/>
-            <a:endParaRPr lang="en-US"/>
-          </a:p>
-        </p:txBody>
-      </p:sp>
-      <p:sp>
-        <p:nvSpPr>
-          <p:cNvPr id="2" name="Title 1">
-            <a:extLst>
-              <a:ext uri="{FF2B5EF4-FFF2-40B4-BE49-F238E27FC236}">
-                <a16:creationId xmlns:a16="http://schemas.microsoft.com/office/drawing/2014/main" id="{921633EB-7DCB-4DDC-80AF-C885A3EE1245}"/>
-              </a:ext>
-            </a:extLst>
-          </p:cNvPr>
-          <p:cNvSpPr>
-            <a:spLocks noGrp="1"/>
-          </p:cNvSpPr>
-          <p:nvPr>
-            <p:ph type="title"/>
-          </p:nvPr>
-        </p:nvSpPr>
-        <p:spPr>
-          <a:xfrm>
-            <a:off x="4382724" y="702156"/>
-            <a:ext cx="7225075" cy="1013800"/>
-          </a:xfrm>
-        </p:spPr>
-        <p:txBody>
-          <a:bodyPr>
-            <a:normAutofit/>
-          </a:bodyPr>
-          <a:lstStyle/>
-          <a:p>
-            <a:r>
-              <a:rPr lang="en-US" sz="2800" dirty="0">
-                <a:solidFill>
-                  <a:schemeClr val="accent1"/>
-                </a:solidFill>
-              </a:rPr>
-              <a:t>Efficiency Metrics of CHICAGO PD</a:t>
-            </a:r>
-          </a:p>
-        </p:txBody>
-      </p:sp>
-      <p:grpSp>
-        <p:nvGrpSpPr>
-          <p:cNvPr id="22" name="Group 21">
-            <a:extLst>
-              <a:ext uri="{FF2B5EF4-FFF2-40B4-BE49-F238E27FC236}">
-                <a16:creationId xmlns:a16="http://schemas.microsoft.com/office/drawing/2014/main" id="{689DE470-D3F7-4C9B-B30A-CDD6B6F9B140}"/>
-              </a:ext>
-              <a:ext uri="{C183D7F6-B498-43B3-948B-1728B52AA6E4}">
-                <adec:decorative xmlns:adec="http://schemas.microsoft.com/office/drawing/2017/decorative" val="1"/>
-              </a:ext>
-            </a:extLst>
-          </p:cNvPr>
-          <p:cNvGrpSpPr>
-            <a:grpSpLocks noGrp="1" noUngrp="1" noRot="1" noChangeAspect="1" noMove="1" noResize="1"/>
-          </p:cNvGrpSpPr>
-          <p:nvPr>
-            <p:extLst>
-              <p:ext uri="{386F3935-93C4-4BCD-93E2-E3B085C9AB24}">
-                <p16:designElem xmlns:p16="http://schemas.microsoft.com/office/powerpoint/2015/main" val="1"/>
-              </p:ext>
-            </p:extLst>
-          </p:nvPr>
-        </p:nvGrpSpPr>
-        <p:grpSpPr>
-          <a:xfrm>
-            <a:off x="446534" y="453643"/>
-            <a:ext cx="11298933" cy="98554"/>
-            <a:chOff x="446534" y="453643"/>
-            <a:chExt cx="11298933" cy="98554"/>
-          </a:xfrm>
-        </p:grpSpPr>
-        <p:sp>
-          <p:nvSpPr>
-            <p:cNvPr id="23" name="Rectangle 22">
-              <a:extLst>
-                <a:ext uri="{FF2B5EF4-FFF2-40B4-BE49-F238E27FC236}">
-                  <a16:creationId xmlns:a16="http://schemas.microsoft.com/office/drawing/2014/main" id="{A17E2015-EDB0-4A2D-84A8-190C239D20A1}"/>
-                </a:ext>
-                <a:ext uri="{C183D7F6-B498-43B3-948B-1728B52AA6E4}">
-                  <adec:decorative xmlns:adec="http://schemas.microsoft.com/office/drawing/2017/decorative" val="1"/>
-                </a:ext>
-              </a:extLst>
-            </p:cNvPr>
-            <p:cNvSpPr/>
-            <p:nvPr>
-              <p:extLst>
-                <p:ext uri="{386F3935-93C4-4BCD-93E2-E3B085C9AB24}">
-                  <p16:designElem xmlns:p16="http://schemas.microsoft.com/office/powerpoint/2015/main" val="1"/>
-                </p:ext>
-              </p:extLst>
-            </p:nvPr>
-          </p:nvSpPr>
-          <p:spPr>
-            <a:xfrm>
-              <a:off x="446534" y="457200"/>
-              <a:ext cx="3703320" cy="94997"/>
-            </a:xfrm>
-            <a:prstGeom prst="rect">
-              <a:avLst/>
-            </a:prstGeom>
-            <a:solidFill>
-              <a:schemeClr val="accent1"/>
-            </a:solidFill>
-            <a:ln>
-              <a:noFill/>
-            </a:ln>
-            <a:effectLst/>
-          </p:spPr>
-          <p:style>
-            <a:lnRef idx="1">
-              <a:schemeClr val="accent1"/>
-            </a:lnRef>
-            <a:fillRef idx="3">
-              <a:schemeClr val="accent1"/>
-            </a:fillRef>
-            <a:effectRef idx="2">
-              <a:schemeClr val="accent1"/>
-            </a:effectRef>
-            <a:fontRef idx="minor">
-              <a:schemeClr val="lt1"/>
-            </a:fontRef>
-          </p:style>
-        </p:sp>
-        <p:sp>
-          <p:nvSpPr>
-            <p:cNvPr id="24" name="Rectangle 23">
-              <a:extLst>
-                <a:ext uri="{FF2B5EF4-FFF2-40B4-BE49-F238E27FC236}">
-                  <a16:creationId xmlns:a16="http://schemas.microsoft.com/office/drawing/2014/main" id="{5490EA47-76B1-4320-98DD-75C74897F623}"/>
-                </a:ext>
-                <a:ext uri="{C183D7F6-B498-43B3-948B-1728B52AA6E4}">
-                  <adec:decorative xmlns:adec="http://schemas.microsoft.com/office/drawing/2017/decorative" val="1"/>
-                </a:ext>
-              </a:extLst>
-            </p:cNvPr>
-            <p:cNvSpPr/>
-            <p:nvPr>
-              <p:extLst>
-                <p:ext uri="{386F3935-93C4-4BCD-93E2-E3B085C9AB24}">
-                  <p16:designElem xmlns:p16="http://schemas.microsoft.com/office/powerpoint/2015/main" val="1"/>
-                </p:ext>
-              </p:extLst>
-            </p:nvPr>
-          </p:nvSpPr>
-          <p:spPr>
-            <a:xfrm>
-              <a:off x="8042147" y="453643"/>
-              <a:ext cx="3703320" cy="98554"/>
-            </a:xfrm>
-            <a:prstGeom prst="rect">
-              <a:avLst/>
-            </a:prstGeom>
-            <a:solidFill>
-              <a:schemeClr val="accent4"/>
-            </a:solidFill>
-            <a:ln>
-              <a:noFill/>
-            </a:ln>
-            <a:effectLst/>
-          </p:spPr>
-          <p:style>
-            <a:lnRef idx="1">
-              <a:schemeClr val="accent1"/>
-            </a:lnRef>
-            <a:fillRef idx="3">
-              <a:schemeClr val="accent1"/>
-            </a:fillRef>
-            <a:effectRef idx="2">
-              <a:schemeClr val="accent1"/>
-            </a:effectRef>
-            <a:fontRef idx="minor">
-              <a:schemeClr val="lt1"/>
-            </a:fontRef>
-          </p:style>
-        </p:sp>
-        <p:sp>
-          <p:nvSpPr>
-            <p:cNvPr id="25" name="Rectangle 24">
-              <a:extLst>
-                <a:ext uri="{FF2B5EF4-FFF2-40B4-BE49-F238E27FC236}">
-                  <a16:creationId xmlns:a16="http://schemas.microsoft.com/office/drawing/2014/main" id="{70573D2A-278F-49E4-AF44-39C48C319C2C}"/>
-                </a:ext>
-                <a:ext uri="{C183D7F6-B498-43B3-948B-1728B52AA6E4}">
-                  <adec:decorative xmlns:adec="http://schemas.microsoft.com/office/drawing/2017/decorative" val="1"/>
-                </a:ext>
-              </a:extLst>
-            </p:cNvPr>
-            <p:cNvSpPr/>
-            <p:nvPr>
-              <p:extLst>
-                <p:ext uri="{386F3935-93C4-4BCD-93E2-E3B085C9AB24}">
-                  <p16:designElem xmlns:p16="http://schemas.microsoft.com/office/powerpoint/2015/main" val="1"/>
-                </p:ext>
-              </p:extLst>
-            </p:nvPr>
-          </p:nvSpPr>
-          <p:spPr>
-            <a:xfrm>
-              <a:off x="4241830" y="457200"/>
-              <a:ext cx="3703320" cy="91440"/>
-            </a:xfrm>
-            <a:prstGeom prst="rect">
-              <a:avLst/>
-            </a:prstGeom>
-            <a:solidFill>
-              <a:schemeClr val="accent2"/>
-            </a:solidFill>
-            <a:ln>
-              <a:noFill/>
-            </a:ln>
-            <a:effectLst/>
-          </p:spPr>
-          <p:style>
-            <a:lnRef idx="1">
-              <a:schemeClr val="accent1"/>
-            </a:lnRef>
-            <a:fillRef idx="3">
-              <a:schemeClr val="accent1"/>
-            </a:fillRef>
-            <a:effectRef idx="2">
-              <a:schemeClr val="accent1"/>
-            </a:effectRef>
-            <a:fontRef idx="minor">
-              <a:schemeClr val="lt1"/>
-            </a:fontRef>
-          </p:style>
-        </p:sp>
-      </p:grpSp>
-      <p:pic>
-        <p:nvPicPr>
-          <p:cNvPr id="10" name="Content Placeholder 4" descr="Charts">
-            <a:extLst>
-              <a:ext uri="{FF2B5EF4-FFF2-40B4-BE49-F238E27FC236}">
-                <a16:creationId xmlns:a16="http://schemas.microsoft.com/office/drawing/2014/main" id="{98CFD7A0-4F30-4D77-A890-546F83A8CE5F}"/>
-              </a:ext>
-            </a:extLst>
-          </p:cNvPr>
-          <p:cNvPicPr>
-            <a:picLocks noChangeAspect="1"/>
-          </p:cNvPicPr>
-          <p:nvPr/>
-        </p:nvPicPr>
-        <p:blipFill rotWithShape="1">
-          <a:blip r:embed="rId3" cstate="screen">
-            <a:extLst>
-              <a:ext uri="{28A0092B-C50C-407E-A947-70E740481C1C}">
-                <a14:useLocalDpi xmlns:a14="http://schemas.microsoft.com/office/drawing/2010/main"/>
-              </a:ext>
-            </a:extLst>
-          </a:blip>
-          <a:srcRect l="2019" r="10599" b="3"/>
-          <a:stretch/>
-        </p:blipFill>
-        <p:spPr>
-          <a:xfrm>
-            <a:off x="446534" y="641102"/>
-            <a:ext cx="3702877" cy="2828500"/>
-          </a:xfrm>
-          <a:prstGeom prst="rect">
-            <a:avLst/>
-          </a:prstGeom>
-        </p:spPr>
-      </p:pic>
-      <p:pic>
-        <p:nvPicPr>
-          <p:cNvPr id="6" name="Content Placeholder 4" descr="Charts">
-            <a:extLst>
-              <a:ext uri="{FF2B5EF4-FFF2-40B4-BE49-F238E27FC236}">
-                <a16:creationId xmlns:a16="http://schemas.microsoft.com/office/drawing/2014/main" id="{8F90B8C4-741B-44DA-A037-941E0770D42F}"/>
-              </a:ext>
-            </a:extLst>
-          </p:cNvPr>
-          <p:cNvPicPr>
-            <a:picLocks noChangeAspect="1"/>
-          </p:cNvPicPr>
-          <p:nvPr/>
-        </p:nvPicPr>
-        <p:blipFill rotWithShape="1">
-          <a:blip r:embed="rId3" cstate="screen">
-            <a:extLst>
-              <a:ext uri="{28A0092B-C50C-407E-A947-70E740481C1C}">
-                <a14:useLocalDpi xmlns:a14="http://schemas.microsoft.com/office/drawing/2010/main"/>
-              </a:ext>
-            </a:extLst>
-          </a:blip>
-          <a:srcRect l="2019" r="10599" b="3"/>
-          <a:stretch/>
-        </p:blipFill>
-        <p:spPr>
-          <a:xfrm>
-            <a:off x="446534" y="3562063"/>
-            <a:ext cx="3702877" cy="2828501"/>
-          </a:xfrm>
-          <a:prstGeom prst="rect">
-            <a:avLst/>
-          </a:prstGeom>
-        </p:spPr>
-      </p:pic>
-      <p:sp>
-        <p:nvSpPr>
-          <p:cNvPr id="15" name="Content Placeholder 6">
-            <a:extLst>
-              <a:ext uri="{FF2B5EF4-FFF2-40B4-BE49-F238E27FC236}">
-                <a16:creationId xmlns:a16="http://schemas.microsoft.com/office/drawing/2014/main" id="{478D51AA-F115-4057-B3B8-AAB8FBC1F4AC}"/>
-              </a:ext>
-            </a:extLst>
-          </p:cNvPr>
-          <p:cNvSpPr>
-            <a:spLocks noGrp="1"/>
-          </p:cNvSpPr>
-          <p:nvPr>
-            <p:ph idx="1"/>
-          </p:nvPr>
-        </p:nvSpPr>
-        <p:spPr>
-          <a:xfrm>
-            <a:off x="4382726" y="1896533"/>
-            <a:ext cx="7225074" cy="3962266"/>
-          </a:xfrm>
-        </p:spPr>
-        <p:txBody>
-          <a:bodyPr>
-            <a:normAutofit/>
-          </a:bodyPr>
-          <a:lstStyle/>
-          <a:p>
-            <a:pPr>
-              <a:lnSpc>
-                <a:spcPct val="90000"/>
-              </a:lnSpc>
-            </a:pPr>
-            <a:r>
-              <a:rPr lang="en-US" sz="2400" dirty="0"/>
-              <a:t>With features- Crime type, Ward, Police District and Police Beat, the model works with an accuracy of 87%</a:t>
-            </a:r>
-          </a:p>
-          <a:p>
-            <a:pPr marL="0" indent="0">
-              <a:lnSpc>
-                <a:spcPct val="90000"/>
-              </a:lnSpc>
-              <a:buNone/>
-            </a:pPr>
-            <a:endParaRPr lang="en-US" sz="2400" dirty="0"/>
-          </a:p>
-          <a:p>
-            <a:pPr>
-              <a:lnSpc>
-                <a:spcPct val="90000"/>
-              </a:lnSpc>
-            </a:pPr>
-            <a:r>
-              <a:rPr lang="en-US" sz="2400" dirty="0"/>
-              <a:t>Limitations in dataset: </a:t>
-            </a:r>
-          </a:p>
-          <a:p>
-            <a:pPr lvl="1">
-              <a:lnSpc>
-                <a:spcPct val="90000"/>
-              </a:lnSpc>
-            </a:pPr>
-            <a:r>
-              <a:rPr lang="en-US" sz="2400" dirty="0"/>
-              <a:t>The lag between event and arrest is unknown.</a:t>
-            </a:r>
-          </a:p>
-          <a:p>
-            <a:pPr lvl="1">
-              <a:lnSpc>
-                <a:spcPct val="90000"/>
-              </a:lnSpc>
-            </a:pPr>
-            <a:r>
-              <a:rPr lang="en-US" sz="2400" dirty="0"/>
-              <a:t>This missing data would help calculating efficiency better. </a:t>
-            </a:r>
-          </a:p>
-        </p:txBody>
-      </p:sp>
-    </p:spTree>
-    <p:extLst>
-      <p:ext uri="{BB962C8B-B14F-4D97-AF65-F5344CB8AC3E}">
-        <p14:creationId xmlns:p14="http://schemas.microsoft.com/office/powerpoint/2010/main" val="3972496005"/>
-      </p:ext>
-    </p:extLst>
-  </p:cSld>
-  <p:clrMapOvr>
-    <a:masterClrMapping/>
-  </p:clrMapOvr>
-</p:sld>
-</file>
-
-<file path=ppt/slides/slide19.xml><?xml version="1.0" encoding="utf-8"?>
-<p:sld xmlns:a="http://schemas.openxmlformats.org/drawingml/2006/main" xmlns:r="http://schemas.openxmlformats.org/officeDocument/2006/relationships" xmlns:p="http://schemas.openxmlformats.org/presentationml/2006/main">
-  <p:cSld>
-    <p:bg>
-      <p:bgPr>
-        <a:solidFill>
-          <a:schemeClr val="bg1"/>
-        </a:solidFill>
-        <a:effectLst/>
-      </p:bgPr>
-    </p:bg>
-    <p:spTree>
-      <p:nvGrpSpPr>
-        <p:cNvPr id="1" name=""/>
-        <p:cNvGrpSpPr/>
-        <p:nvPr/>
-      </p:nvGrpSpPr>
-      <p:grpSpPr>
-        <a:xfrm>
-          <a:off x="0" y="0"/>
-          <a:ext cx="0" cy="0"/>
-          <a:chOff x="0" y="0"/>
-          <a:chExt cx="0" cy="0"/>
-        </a:xfrm>
-      </p:grpSpPr>
-      <p:sp useBgFill="1">
-        <p:nvSpPr>
-          <p:cNvPr id="13" name="Rectangle 12">
-            <a:extLst>
-              <a:ext uri="{FF2B5EF4-FFF2-40B4-BE49-F238E27FC236}">
-                <a16:creationId xmlns:a16="http://schemas.microsoft.com/office/drawing/2014/main" id="{4AE9D071-98CF-435C-BD2B-976514544DC5}"/>
-              </a:ext>
-              <a:ext uri="{C183D7F6-B498-43B3-948B-1728B52AA6E4}">
-                <adec:decorative xmlns:adec="http://schemas.microsoft.com/office/drawing/2017/decorative" val="1"/>
-              </a:ext>
-            </a:extLst>
-          </p:cNvPr>
-          <p:cNvSpPr>
-            <a:spLocks noGrp="1" noRot="1" noChangeAspect="1" noMove="1" noResize="1" noEditPoints="1" noAdjustHandles="1" noChangeArrowheads="1" noChangeShapeType="1" noTextEdit="1"/>
-          </p:cNvSpPr>
-          <p:nvPr>
-            <p:extLst>
-              <p:ext uri="{386F3935-93C4-4BCD-93E2-E3B085C9AB24}">
-                <p16:designElem xmlns:p16="http://schemas.microsoft.com/office/powerpoint/2015/main" val="1"/>
-              </p:ext>
-            </p:extLst>
-          </p:nvPr>
-        </p:nvSpPr>
-        <p:spPr>
-          <a:xfrm>
-            <a:off x="0" y="0"/>
-            <a:ext cx="12192000" cy="6858000"/>
-          </a:xfrm>
-          <a:prstGeom prst="rect">
-            <a:avLst/>
-          </a:prstGeom>
-          <a:ln>
-            <a:noFill/>
-          </a:ln>
-        </p:spPr>
-        <p:style>
-          <a:lnRef idx="2">
-            <a:schemeClr val="accent1">
-              <a:shade val="50000"/>
-            </a:schemeClr>
-          </a:lnRef>
-          <a:fillRef idx="1">
-            <a:schemeClr val="accent1"/>
-          </a:fillRef>
-          <a:effectRef idx="0">
-            <a:schemeClr val="accent1"/>
-          </a:effectRef>
-          <a:fontRef idx="minor">
-            <a:schemeClr val="lt1"/>
-          </a:fontRef>
-        </p:style>
-        <p:txBody>
-          <a:bodyPr rtlCol="0" anchor="ctr"/>
-          <a:lstStyle/>
-          <a:p>
-            <a:pPr algn="ctr"/>
-            <a:endParaRPr lang="en-US" dirty="0"/>
-          </a:p>
-        </p:txBody>
-      </p:sp>
-      <p:pic>
-        <p:nvPicPr>
-          <p:cNvPr id="8" name="Content Placeholder 4" descr="Digital Numbers">
-            <a:extLst>
-              <a:ext uri="{FF2B5EF4-FFF2-40B4-BE49-F238E27FC236}">
-                <a16:creationId xmlns:a16="http://schemas.microsoft.com/office/drawing/2014/main" id="{EA70616B-E344-4856-8DF9-707C26236613}"/>
-              </a:ext>
-            </a:extLst>
-          </p:cNvPr>
-          <p:cNvPicPr>
-            <a:picLocks noChangeAspect="1"/>
-          </p:cNvPicPr>
-          <p:nvPr/>
-        </p:nvPicPr>
-        <p:blipFill rotWithShape="1">
-          <a:blip r:embed="rId3" cstate="screen">
-            <a:extLst>
-              <a:ext uri="{28A0092B-C50C-407E-A947-70E740481C1C}">
-                <a14:useLocalDpi xmlns:a14="http://schemas.microsoft.com/office/drawing/2010/main"/>
-              </a:ext>
-            </a:extLst>
-          </a:blip>
-          <a:srcRect t="10681" r="9091" b="12711"/>
-          <a:stretch/>
-        </p:blipFill>
-        <p:spPr>
-          <a:xfrm>
-            <a:off x="171785" y="76204"/>
-            <a:ext cx="12191980" cy="6857990"/>
-          </a:xfrm>
-          <a:prstGeom prst="rect">
-            <a:avLst/>
-          </a:prstGeom>
-        </p:spPr>
-      </p:pic>
-      <p:grpSp>
-        <p:nvGrpSpPr>
-          <p:cNvPr id="15" name="Group 14">
-            <a:extLst>
-              <a:ext uri="{FF2B5EF4-FFF2-40B4-BE49-F238E27FC236}">
-                <a16:creationId xmlns:a16="http://schemas.microsoft.com/office/drawing/2014/main" id="{D619FC33-16ED-4246-9596-BEFEB55E4CF6}"/>
-              </a:ext>
-              <a:ext uri="{C183D7F6-B498-43B3-948B-1728B52AA6E4}">
-                <adec:decorative xmlns:adec="http://schemas.microsoft.com/office/drawing/2017/decorative" val="1"/>
-              </a:ext>
-            </a:extLst>
-          </p:cNvPr>
-          <p:cNvGrpSpPr>
-            <a:grpSpLocks noGrp="1" noUngrp="1" noRot="1" noChangeAspect="1" noMove="1" noResize="1"/>
-          </p:cNvGrpSpPr>
-          <p:nvPr>
-            <p:extLst>
-              <p:ext uri="{386F3935-93C4-4BCD-93E2-E3B085C9AB24}">
-                <p16:designElem xmlns:p16="http://schemas.microsoft.com/office/powerpoint/2015/main" val="1"/>
-              </p:ext>
-            </p:extLst>
-          </p:nvPr>
-        </p:nvGrpSpPr>
-        <p:grpSpPr>
-          <a:xfrm>
-            <a:off x="438067" y="457200"/>
-            <a:ext cx="7507083" cy="5935132"/>
-            <a:chOff x="438067" y="457200"/>
-            <a:chExt cx="7507083" cy="5935132"/>
-          </a:xfrm>
-        </p:grpSpPr>
-        <p:sp>
-          <p:nvSpPr>
-            <p:cNvPr id="16" name="Rectangle 15">
-              <a:extLst>
-                <a:ext uri="{FF2B5EF4-FFF2-40B4-BE49-F238E27FC236}">
-                  <a16:creationId xmlns:a16="http://schemas.microsoft.com/office/drawing/2014/main" id="{2EEA80E1-F99F-4009-837F-2F72F8A5D580}"/>
-                </a:ext>
-                <a:ext uri="{C183D7F6-B498-43B3-948B-1728B52AA6E4}">
-                  <adec:decorative xmlns:adec="http://schemas.microsoft.com/office/drawing/2017/decorative" val="1"/>
-                </a:ext>
-              </a:extLst>
-            </p:cNvPr>
-            <p:cNvSpPr/>
-            <p:nvPr>
-              <p:extLst>
-                <p:ext uri="{386F3935-93C4-4BCD-93E2-E3B085C9AB24}">
-                  <p16:designElem xmlns:p16="http://schemas.microsoft.com/office/powerpoint/2015/main" val="1"/>
-                </p:ext>
-              </p:extLst>
-            </p:nvPr>
-          </p:nvSpPr>
-          <p:spPr>
-            <a:xfrm>
-              <a:off x="438067" y="618067"/>
-              <a:ext cx="7503665" cy="5774265"/>
-            </a:xfrm>
-            <a:prstGeom prst="rect">
-              <a:avLst/>
-            </a:prstGeom>
-            <a:solidFill>
-              <a:schemeClr val="accent1">
-                <a:alpha val="97000"/>
-              </a:schemeClr>
-            </a:solidFill>
-            <a:ln w="6350" cmpd="sng">
-              <a:noFill/>
-            </a:ln>
-            <a:effectLst/>
-          </p:spPr>
-          <p:style>
-            <a:lnRef idx="1">
-              <a:schemeClr val="accent1"/>
-            </a:lnRef>
-            <a:fillRef idx="3">
-              <a:schemeClr val="accent1"/>
-            </a:fillRef>
-            <a:effectRef idx="2">
-              <a:schemeClr val="accent1"/>
-            </a:effectRef>
-            <a:fontRef idx="minor">
-              <a:schemeClr val="lt1"/>
-            </a:fontRef>
-          </p:style>
-        </p:sp>
-        <p:sp>
-          <p:nvSpPr>
-            <p:cNvPr id="17" name="Rectangle 16">
-              <a:extLst>
-                <a:ext uri="{FF2B5EF4-FFF2-40B4-BE49-F238E27FC236}">
-                  <a16:creationId xmlns:a16="http://schemas.microsoft.com/office/drawing/2014/main" id="{0230AF9A-4641-4BD8-9F95-9607CD304039}"/>
-                </a:ext>
-                <a:ext uri="{C183D7F6-B498-43B3-948B-1728B52AA6E4}">
-                  <adec:decorative xmlns:adec="http://schemas.microsoft.com/office/drawing/2017/decorative" val="1"/>
-                </a:ext>
-              </a:extLst>
-            </p:cNvPr>
-            <p:cNvSpPr/>
-            <p:nvPr>
-              <p:extLst>
-                <p:ext uri="{386F3935-93C4-4BCD-93E2-E3B085C9AB24}">
-                  <p16:designElem xmlns:p16="http://schemas.microsoft.com/office/powerpoint/2015/main" val="1"/>
-                </p:ext>
-              </p:extLst>
-            </p:nvPr>
-          </p:nvSpPr>
-          <p:spPr>
-            <a:xfrm>
-              <a:off x="438068" y="457200"/>
-              <a:ext cx="3703320" cy="94997"/>
-            </a:xfrm>
-            <a:prstGeom prst="rect">
-              <a:avLst/>
-            </a:prstGeom>
-            <a:solidFill>
-              <a:schemeClr val="accent1"/>
-            </a:solidFill>
-            <a:ln>
-              <a:noFill/>
-            </a:ln>
-            <a:effectLst/>
-          </p:spPr>
-          <p:style>
-            <a:lnRef idx="1">
-              <a:schemeClr val="accent1"/>
-            </a:lnRef>
-            <a:fillRef idx="3">
-              <a:schemeClr val="accent1"/>
-            </a:fillRef>
-            <a:effectRef idx="2">
-              <a:schemeClr val="accent1"/>
-            </a:effectRef>
-            <a:fontRef idx="minor">
-              <a:schemeClr val="lt1"/>
-            </a:fontRef>
-          </p:style>
-        </p:sp>
-        <p:sp>
-          <p:nvSpPr>
-            <p:cNvPr id="18" name="Rectangle 17">
-              <a:extLst>
-                <a:ext uri="{FF2B5EF4-FFF2-40B4-BE49-F238E27FC236}">
-                  <a16:creationId xmlns:a16="http://schemas.microsoft.com/office/drawing/2014/main" id="{8703D4EC-9389-41B6-B88B-B6FDC8CD3330}"/>
-                </a:ext>
-                <a:ext uri="{C183D7F6-B498-43B3-948B-1728B52AA6E4}">
-                  <adec:decorative xmlns:adec="http://schemas.microsoft.com/office/drawing/2017/decorative" val="1"/>
-                </a:ext>
-              </a:extLst>
-            </p:cNvPr>
-            <p:cNvSpPr/>
-            <p:nvPr>
-              <p:extLst>
-                <p:ext uri="{386F3935-93C4-4BCD-93E2-E3B085C9AB24}">
-                  <p16:designElem xmlns:p16="http://schemas.microsoft.com/office/powerpoint/2015/main" val="1"/>
-                </p:ext>
-              </p:extLst>
-            </p:nvPr>
-          </p:nvSpPr>
-          <p:spPr>
-            <a:xfrm>
-              <a:off x="4241830" y="457200"/>
-              <a:ext cx="3703320" cy="91440"/>
-            </a:xfrm>
-            <a:prstGeom prst="rect">
-              <a:avLst/>
-            </a:prstGeom>
-            <a:solidFill>
-              <a:schemeClr val="accent2"/>
-            </a:solidFill>
-            <a:ln>
-              <a:noFill/>
-            </a:ln>
-            <a:effectLst/>
-          </p:spPr>
-          <p:style>
-            <a:lnRef idx="1">
-              <a:schemeClr val="accent1"/>
-            </a:lnRef>
-            <a:fillRef idx="3">
-              <a:schemeClr val="accent1"/>
-            </a:fillRef>
-            <a:effectRef idx="2">
-              <a:schemeClr val="accent1"/>
-            </a:effectRef>
-            <a:fontRef idx="minor">
-              <a:schemeClr val="lt1"/>
-            </a:fontRef>
-          </p:style>
-        </p:sp>
-      </p:grpSp>
-      <p:sp>
-        <p:nvSpPr>
-          <p:cNvPr id="2" name="Title 1">
-            <a:extLst>
-              <a:ext uri="{FF2B5EF4-FFF2-40B4-BE49-F238E27FC236}">
-                <a16:creationId xmlns:a16="http://schemas.microsoft.com/office/drawing/2014/main" id="{7F2616EE-270D-4F4C-BA1F-2708D387B800}"/>
-              </a:ext>
-            </a:extLst>
-          </p:cNvPr>
-          <p:cNvSpPr>
-            <a:spLocks noGrp="1"/>
-          </p:cNvSpPr>
-          <p:nvPr>
-            <p:ph type="title"/>
-          </p:nvPr>
-        </p:nvSpPr>
-        <p:spPr>
-          <a:xfrm>
-            <a:off x="584200" y="1006956"/>
-            <a:ext cx="7213600" cy="1121871"/>
-          </a:xfrm>
-        </p:spPr>
-        <p:txBody>
-          <a:bodyPr anchor="ctr">
-            <a:normAutofit/>
-          </a:bodyPr>
-          <a:lstStyle/>
-          <a:p>
-            <a:pPr algn="ctr"/>
-            <a:r>
-              <a:rPr lang="en-US" dirty="0"/>
-              <a:t>Algorithm with best outcomes</a:t>
-            </a:r>
-          </a:p>
-        </p:txBody>
-      </p:sp>
-      <p:graphicFrame>
-        <p:nvGraphicFramePr>
-          <p:cNvPr id="6" name="Content Placeholder 5" descr="SmartArt">
-            <a:extLst>
-              <a:ext uri="{FF2B5EF4-FFF2-40B4-BE49-F238E27FC236}">
-                <a16:creationId xmlns:a16="http://schemas.microsoft.com/office/drawing/2014/main" id="{BF629521-FFD2-45DA-9D1D-A5F09BD5A2D9}"/>
-              </a:ext>
-            </a:extLst>
-          </p:cNvPr>
-          <p:cNvGraphicFramePr>
-            <a:graphicFrameLocks noGrp="1"/>
-          </p:cNvGraphicFramePr>
-          <p:nvPr>
-            <p:ph idx="1"/>
-            <p:extLst>
-              <p:ext uri="{D42A27DB-BD31-4B8C-83A1-F6EECF244321}">
-                <p14:modId xmlns:p14="http://schemas.microsoft.com/office/powerpoint/2010/main" val="1658254405"/>
-              </p:ext>
-            </p:extLst>
-          </p:nvPr>
-        </p:nvGraphicFramePr>
-        <p:xfrm>
-          <a:off x="719571" y="2198254"/>
-          <a:ext cx="6854248" cy="3563938"/>
-        </p:xfrm>
-        <a:graphic>
-          <a:graphicData uri="http://schemas.openxmlformats.org/drawingml/2006/diagram">
-            <dgm:relIds xmlns:dgm="http://schemas.openxmlformats.org/drawingml/2006/diagram" xmlns:r="http://schemas.openxmlformats.org/officeDocument/2006/relationships" r:dm="rId4" r:lo="rId5" r:qs="rId6" r:cs="rId7"/>
-          </a:graphicData>
-        </a:graphic>
-      </p:graphicFrame>
-    </p:spTree>
-    <p:extLst>
-      <p:ext uri="{BB962C8B-B14F-4D97-AF65-F5344CB8AC3E}">
-        <p14:creationId xmlns:p14="http://schemas.microsoft.com/office/powerpoint/2010/main" val="4209322005"/>
       </p:ext>
     </p:extLst>
   </p:cSld>
@@ -32818,6 +32695,840 @@
 <file path=ppt/slides/slide20.xml><?xml version="1.0" encoding="utf-8"?>
 <p:sld xmlns:a="http://schemas.openxmlformats.org/drawingml/2006/main" xmlns:r="http://schemas.openxmlformats.org/officeDocument/2006/relationships" xmlns:p="http://schemas.openxmlformats.org/presentationml/2006/main">
   <p:cSld>
+    <p:bg>
+      <p:bgPr>
+        <a:solidFill>
+          <a:schemeClr val="bg1"/>
+        </a:solidFill>
+        <a:effectLst/>
+      </p:bgPr>
+    </p:bg>
+    <p:spTree>
+      <p:nvGrpSpPr>
+        <p:cNvPr id="1" name=""/>
+        <p:cNvGrpSpPr/>
+        <p:nvPr/>
+      </p:nvGrpSpPr>
+      <p:grpSpPr>
+        <a:xfrm>
+          <a:off x="0" y="0"/>
+          <a:ext cx="0" cy="0"/>
+          <a:chOff x="0" y="0"/>
+          <a:chExt cx="0" cy="0"/>
+        </a:xfrm>
+      </p:grpSpPr>
+      <p:sp useBgFill="1">
+        <p:nvSpPr>
+          <p:cNvPr id="46" name="Rectangle 45">
+            <a:extLst>
+              <a:ext uri="{FF2B5EF4-FFF2-40B4-BE49-F238E27FC236}">
+                <a16:creationId xmlns:a16="http://schemas.microsoft.com/office/drawing/2014/main" id="{9175732C-A509-470D-9836-76E48191BC29}"/>
+              </a:ext>
+              <a:ext uri="{C183D7F6-B498-43B3-948B-1728B52AA6E4}">
+                <adec:decorative xmlns:adec="http://schemas.microsoft.com/office/drawing/2017/decorative" val="1"/>
+              </a:ext>
+            </a:extLst>
+          </p:cNvPr>
+          <p:cNvSpPr>
+            <a:spLocks noGrp="1" noRot="1" noChangeAspect="1" noMove="1" noResize="1" noEditPoints="1" noAdjustHandles="1" noChangeArrowheads="1" noChangeShapeType="1" noTextEdit="1"/>
+          </p:cNvSpPr>
+          <p:nvPr>
+            <p:extLst>
+              <p:ext uri="{386F3935-93C4-4BCD-93E2-E3B085C9AB24}">
+                <p16:designElem xmlns:p16="http://schemas.microsoft.com/office/powerpoint/2015/main" val="1"/>
+              </p:ext>
+            </p:extLst>
+          </p:nvPr>
+        </p:nvSpPr>
+        <p:spPr>
+          <a:xfrm>
+            <a:off x="0" y="0"/>
+            <a:ext cx="12192000" cy="6858000"/>
+          </a:xfrm>
+          <a:prstGeom prst="rect">
+            <a:avLst/>
+          </a:prstGeom>
+          <a:ln>
+            <a:noFill/>
+          </a:ln>
+        </p:spPr>
+        <p:style>
+          <a:lnRef idx="2">
+            <a:schemeClr val="accent1">
+              <a:shade val="50000"/>
+            </a:schemeClr>
+          </a:lnRef>
+          <a:fillRef idx="1">
+            <a:schemeClr val="accent1"/>
+          </a:fillRef>
+          <a:effectRef idx="0">
+            <a:schemeClr val="accent1"/>
+          </a:effectRef>
+          <a:fontRef idx="minor">
+            <a:schemeClr val="lt1"/>
+          </a:fontRef>
+        </p:style>
+        <p:txBody>
+          <a:bodyPr rtlCol="0" anchor="ctr"/>
+          <a:lstStyle/>
+          <a:p>
+            <a:pPr algn="ctr"/>
+            <a:endParaRPr lang="en-US"/>
+          </a:p>
+        </p:txBody>
+      </p:sp>
+      <p:sp>
+        <p:nvSpPr>
+          <p:cNvPr id="2" name="Title 1">
+            <a:extLst>
+              <a:ext uri="{FF2B5EF4-FFF2-40B4-BE49-F238E27FC236}">
+                <a16:creationId xmlns:a16="http://schemas.microsoft.com/office/drawing/2014/main" id="{921633EB-7DCB-4DDC-80AF-C885A3EE1245}"/>
+              </a:ext>
+            </a:extLst>
+          </p:cNvPr>
+          <p:cNvSpPr>
+            <a:spLocks noGrp="1"/>
+          </p:cNvSpPr>
+          <p:nvPr>
+            <p:ph type="title"/>
+          </p:nvPr>
+        </p:nvSpPr>
+        <p:spPr>
+          <a:xfrm>
+            <a:off x="584202" y="702156"/>
+            <a:ext cx="7225075" cy="1013800"/>
+          </a:xfrm>
+        </p:spPr>
+        <p:txBody>
+          <a:bodyPr>
+            <a:normAutofit/>
+          </a:bodyPr>
+          <a:lstStyle/>
+          <a:p>
+            <a:r>
+              <a:rPr lang="en-US" sz="2800">
+                <a:solidFill>
+                  <a:schemeClr val="accent1"/>
+                </a:solidFill>
+              </a:rPr>
+              <a:t>Efficiency Metrics of CHICAGO PD</a:t>
+            </a:r>
+          </a:p>
+        </p:txBody>
+      </p:sp>
+      <p:grpSp>
+        <p:nvGrpSpPr>
+          <p:cNvPr id="48" name="Group 47">
+            <a:extLst>
+              <a:ext uri="{FF2B5EF4-FFF2-40B4-BE49-F238E27FC236}">
+                <a16:creationId xmlns:a16="http://schemas.microsoft.com/office/drawing/2014/main" id="{376D5795-E463-41B9-85D2-473EE0A46B3B}"/>
+              </a:ext>
+              <a:ext uri="{C183D7F6-B498-43B3-948B-1728B52AA6E4}">
+                <adec:decorative xmlns:adec="http://schemas.microsoft.com/office/drawing/2017/decorative" val="1"/>
+              </a:ext>
+            </a:extLst>
+          </p:cNvPr>
+          <p:cNvGrpSpPr>
+            <a:grpSpLocks noGrp="1" noUngrp="1" noRot="1" noChangeAspect="1" noMove="1" noResize="1"/>
+          </p:cNvGrpSpPr>
+          <p:nvPr>
+            <p:extLst>
+              <p:ext uri="{386F3935-93C4-4BCD-93E2-E3B085C9AB24}">
+                <p16:designElem xmlns:p16="http://schemas.microsoft.com/office/powerpoint/2015/main" val="1"/>
+              </p:ext>
+            </p:extLst>
+          </p:nvPr>
+        </p:nvGrpSpPr>
+        <p:grpSpPr>
+          <a:xfrm>
+            <a:off x="446534" y="453643"/>
+            <a:ext cx="11298933" cy="98554"/>
+            <a:chOff x="446534" y="453643"/>
+            <a:chExt cx="11298933" cy="98554"/>
+          </a:xfrm>
+        </p:grpSpPr>
+        <p:sp>
+          <p:nvSpPr>
+            <p:cNvPr id="49" name="Rectangle 48">
+              <a:extLst>
+                <a:ext uri="{FF2B5EF4-FFF2-40B4-BE49-F238E27FC236}">
+                  <a16:creationId xmlns:a16="http://schemas.microsoft.com/office/drawing/2014/main" id="{9CF27612-C535-4D0C-9EAE-87F74C97B614}"/>
+                </a:ext>
+                <a:ext uri="{C183D7F6-B498-43B3-948B-1728B52AA6E4}">
+                  <adec:decorative xmlns:adec="http://schemas.microsoft.com/office/drawing/2017/decorative" val="1"/>
+                </a:ext>
+              </a:extLst>
+            </p:cNvPr>
+            <p:cNvSpPr/>
+            <p:nvPr>
+              <p:extLst>
+                <p:ext uri="{386F3935-93C4-4BCD-93E2-E3B085C9AB24}">
+                  <p16:designElem xmlns:p16="http://schemas.microsoft.com/office/powerpoint/2015/main" val="1"/>
+                </p:ext>
+              </p:extLst>
+            </p:nvPr>
+          </p:nvSpPr>
+          <p:spPr>
+            <a:xfrm>
+              <a:off x="446534" y="457200"/>
+              <a:ext cx="3703320" cy="94997"/>
+            </a:xfrm>
+            <a:prstGeom prst="rect">
+              <a:avLst/>
+            </a:prstGeom>
+            <a:solidFill>
+              <a:schemeClr val="accent1"/>
+            </a:solidFill>
+            <a:ln>
+              <a:noFill/>
+            </a:ln>
+            <a:effectLst/>
+          </p:spPr>
+          <p:style>
+            <a:lnRef idx="1">
+              <a:schemeClr val="accent1"/>
+            </a:lnRef>
+            <a:fillRef idx="3">
+              <a:schemeClr val="accent1"/>
+            </a:fillRef>
+            <a:effectRef idx="2">
+              <a:schemeClr val="accent1"/>
+            </a:effectRef>
+            <a:fontRef idx="minor">
+              <a:schemeClr val="lt1"/>
+            </a:fontRef>
+          </p:style>
+        </p:sp>
+        <p:sp>
+          <p:nvSpPr>
+            <p:cNvPr id="50" name="Rectangle 49">
+              <a:extLst>
+                <a:ext uri="{FF2B5EF4-FFF2-40B4-BE49-F238E27FC236}">
+                  <a16:creationId xmlns:a16="http://schemas.microsoft.com/office/drawing/2014/main" id="{B8BFEC1B-A380-4A69-AC71-88399B644F8F}"/>
+                </a:ext>
+                <a:ext uri="{C183D7F6-B498-43B3-948B-1728B52AA6E4}">
+                  <adec:decorative xmlns:adec="http://schemas.microsoft.com/office/drawing/2017/decorative" val="1"/>
+                </a:ext>
+              </a:extLst>
+            </p:cNvPr>
+            <p:cNvSpPr/>
+            <p:nvPr>
+              <p:extLst>
+                <p:ext uri="{386F3935-93C4-4BCD-93E2-E3B085C9AB24}">
+                  <p16:designElem xmlns:p16="http://schemas.microsoft.com/office/powerpoint/2015/main" val="1"/>
+                </p:ext>
+              </p:extLst>
+            </p:nvPr>
+          </p:nvSpPr>
+          <p:spPr>
+            <a:xfrm>
+              <a:off x="8042147" y="453643"/>
+              <a:ext cx="3703320" cy="98554"/>
+            </a:xfrm>
+            <a:prstGeom prst="rect">
+              <a:avLst/>
+            </a:prstGeom>
+            <a:solidFill>
+              <a:schemeClr val="accent4"/>
+            </a:solidFill>
+            <a:ln>
+              <a:noFill/>
+            </a:ln>
+            <a:effectLst/>
+          </p:spPr>
+          <p:style>
+            <a:lnRef idx="1">
+              <a:schemeClr val="accent1"/>
+            </a:lnRef>
+            <a:fillRef idx="3">
+              <a:schemeClr val="accent1"/>
+            </a:fillRef>
+            <a:effectRef idx="2">
+              <a:schemeClr val="accent1"/>
+            </a:effectRef>
+            <a:fontRef idx="minor">
+              <a:schemeClr val="lt1"/>
+            </a:fontRef>
+          </p:style>
+        </p:sp>
+        <p:sp>
+          <p:nvSpPr>
+            <p:cNvPr id="51" name="Rectangle 50">
+              <a:extLst>
+                <a:ext uri="{FF2B5EF4-FFF2-40B4-BE49-F238E27FC236}">
+                  <a16:creationId xmlns:a16="http://schemas.microsoft.com/office/drawing/2014/main" id="{689AB692-3273-4D6B-8AA7-674073E95819}"/>
+                </a:ext>
+                <a:ext uri="{C183D7F6-B498-43B3-948B-1728B52AA6E4}">
+                  <adec:decorative xmlns:adec="http://schemas.microsoft.com/office/drawing/2017/decorative" val="1"/>
+                </a:ext>
+              </a:extLst>
+            </p:cNvPr>
+            <p:cNvSpPr/>
+            <p:nvPr>
+              <p:extLst>
+                <p:ext uri="{386F3935-93C4-4BCD-93E2-E3B085C9AB24}">
+                  <p16:designElem xmlns:p16="http://schemas.microsoft.com/office/powerpoint/2015/main" val="1"/>
+                </p:ext>
+              </p:extLst>
+            </p:nvPr>
+          </p:nvSpPr>
+          <p:spPr>
+            <a:xfrm>
+              <a:off x="4241830" y="457200"/>
+              <a:ext cx="3703320" cy="91440"/>
+            </a:xfrm>
+            <a:prstGeom prst="rect">
+              <a:avLst/>
+            </a:prstGeom>
+            <a:solidFill>
+              <a:schemeClr val="accent2"/>
+            </a:solidFill>
+            <a:ln>
+              <a:noFill/>
+            </a:ln>
+            <a:effectLst/>
+          </p:spPr>
+          <p:style>
+            <a:lnRef idx="1">
+              <a:schemeClr val="accent1"/>
+            </a:lnRef>
+            <a:fillRef idx="3">
+              <a:schemeClr val="accent1"/>
+            </a:fillRef>
+            <a:effectRef idx="2">
+              <a:schemeClr val="accent1"/>
+            </a:effectRef>
+            <a:fontRef idx="minor">
+              <a:schemeClr val="lt1"/>
+            </a:fontRef>
+          </p:style>
+        </p:sp>
+      </p:grpSp>
+      <p:sp>
+        <p:nvSpPr>
+          <p:cNvPr id="15" name="Content Placeholder 6">
+            <a:extLst>
+              <a:ext uri="{FF2B5EF4-FFF2-40B4-BE49-F238E27FC236}">
+                <a16:creationId xmlns:a16="http://schemas.microsoft.com/office/drawing/2014/main" id="{478D51AA-F115-4057-B3B8-AAB8FBC1F4AC}"/>
+              </a:ext>
+            </a:extLst>
+          </p:cNvPr>
+          <p:cNvSpPr>
+            <a:spLocks noGrp="1"/>
+          </p:cNvSpPr>
+          <p:nvPr>
+            <p:ph idx="1"/>
+          </p:nvPr>
+        </p:nvSpPr>
+        <p:spPr>
+          <a:xfrm>
+            <a:off x="584204" y="1896533"/>
+            <a:ext cx="7225074" cy="3962266"/>
+          </a:xfrm>
+        </p:spPr>
+        <p:txBody>
+          <a:bodyPr>
+            <a:normAutofit/>
+          </a:bodyPr>
+          <a:lstStyle/>
+          <a:p>
+            <a:r>
+              <a:rPr lang="en-US" sz="2400" dirty="0"/>
+              <a:t>With features- Crime type, Ward, Police District and Police Beat, the model works with an accuracy of 87%</a:t>
+            </a:r>
+          </a:p>
+          <a:p>
+            <a:pPr marL="0" indent="0">
+              <a:buNone/>
+            </a:pPr>
+            <a:endParaRPr lang="en-US" sz="2400" dirty="0"/>
+          </a:p>
+          <a:p>
+            <a:r>
+              <a:rPr lang="en-US" sz="2400" dirty="0"/>
+              <a:t>Limitations in dataset: </a:t>
+            </a:r>
+          </a:p>
+          <a:p>
+            <a:pPr lvl="1"/>
+            <a:r>
+              <a:rPr lang="en-US" sz="2400" dirty="0"/>
+              <a:t>The lag between event and arrest is unknown.</a:t>
+            </a:r>
+          </a:p>
+          <a:p>
+            <a:pPr lvl="1"/>
+            <a:r>
+              <a:rPr lang="en-US" sz="2400" dirty="0"/>
+              <a:t>This missing data would help calculating efficiency better. </a:t>
+            </a:r>
+          </a:p>
+        </p:txBody>
+      </p:sp>
+      <p:pic>
+        <p:nvPicPr>
+          <p:cNvPr id="7" name="Picture 6" descr="A screenshot of a cell phone&#10;&#10;Description automatically generated">
+            <a:extLst>
+              <a:ext uri="{FF2B5EF4-FFF2-40B4-BE49-F238E27FC236}">
+                <a16:creationId xmlns:a16="http://schemas.microsoft.com/office/drawing/2014/main" id="{CC08C762-ACEB-47E0-82EA-26CFC2981881}"/>
+              </a:ext>
+            </a:extLst>
+          </p:cNvPr>
+          <p:cNvPicPr>
+            <a:picLocks noChangeAspect="1"/>
+          </p:cNvPicPr>
+          <p:nvPr/>
+        </p:nvPicPr>
+        <p:blipFill rotWithShape="1">
+          <a:blip r:embed="rId3"/>
+          <a:srcRect l="4023" r="4665"/>
+          <a:stretch/>
+        </p:blipFill>
+        <p:spPr>
+          <a:xfrm>
+            <a:off x="8042590" y="641102"/>
+            <a:ext cx="3702877" cy="2828500"/>
+          </a:xfrm>
+          <a:prstGeom prst="rect">
+            <a:avLst/>
+          </a:prstGeom>
+        </p:spPr>
+      </p:pic>
+      <p:pic>
+        <p:nvPicPr>
+          <p:cNvPr id="4" name="Picture 3" descr="A picture containing drawing&#10;&#10;Description automatically generated">
+            <a:extLst>
+              <a:ext uri="{FF2B5EF4-FFF2-40B4-BE49-F238E27FC236}">
+                <a16:creationId xmlns:a16="http://schemas.microsoft.com/office/drawing/2014/main" id="{8A93D58E-DBB4-42E7-875A-044C9D37CA32}"/>
+              </a:ext>
+            </a:extLst>
+          </p:cNvPr>
+          <p:cNvPicPr>
+            <a:picLocks noChangeAspect="1"/>
+          </p:cNvPicPr>
+          <p:nvPr/>
+        </p:nvPicPr>
+        <p:blipFill rotWithShape="1">
+          <a:blip r:embed="rId4"/>
+          <a:srcRect l="2267" r="7401" b="-2"/>
+          <a:stretch/>
+        </p:blipFill>
+        <p:spPr>
+          <a:xfrm>
+            <a:off x="8042590" y="3562063"/>
+            <a:ext cx="3702877" cy="2828501"/>
+          </a:xfrm>
+          <a:prstGeom prst="rect">
+            <a:avLst/>
+          </a:prstGeom>
+        </p:spPr>
+      </p:pic>
+    </p:spTree>
+    <p:extLst>
+      <p:ext uri="{BB962C8B-B14F-4D97-AF65-F5344CB8AC3E}">
+        <p14:creationId xmlns:p14="http://schemas.microsoft.com/office/powerpoint/2010/main" val="3972496005"/>
+      </p:ext>
+    </p:extLst>
+  </p:cSld>
+  <p:clrMapOvr>
+    <a:masterClrMapping/>
+  </p:clrMapOvr>
+</p:sld>
+</file>
+
+<file path=ppt/slides/slide21.xml><?xml version="1.0" encoding="utf-8"?>
+<p:sld xmlns:a="http://schemas.openxmlformats.org/drawingml/2006/main" xmlns:r="http://schemas.openxmlformats.org/officeDocument/2006/relationships" xmlns:p="http://schemas.openxmlformats.org/presentationml/2006/main">
+  <p:cSld>
+    <p:bg>
+      <p:bgPr>
+        <a:solidFill>
+          <a:schemeClr val="bg1"/>
+        </a:solidFill>
+        <a:effectLst/>
+      </p:bgPr>
+    </p:bg>
+    <p:spTree>
+      <p:nvGrpSpPr>
+        <p:cNvPr id="1" name=""/>
+        <p:cNvGrpSpPr/>
+        <p:nvPr/>
+      </p:nvGrpSpPr>
+      <p:grpSpPr>
+        <a:xfrm>
+          <a:off x="0" y="0"/>
+          <a:ext cx="0" cy="0"/>
+          <a:chOff x="0" y="0"/>
+          <a:chExt cx="0" cy="0"/>
+        </a:xfrm>
+      </p:grpSpPr>
+      <p:sp useBgFill="1">
+        <p:nvSpPr>
+          <p:cNvPr id="13" name="Rectangle 12">
+            <a:extLst>
+              <a:ext uri="{FF2B5EF4-FFF2-40B4-BE49-F238E27FC236}">
+                <a16:creationId xmlns:a16="http://schemas.microsoft.com/office/drawing/2014/main" id="{4AE9D071-98CF-435C-BD2B-976514544DC5}"/>
+              </a:ext>
+              <a:ext uri="{C183D7F6-B498-43B3-948B-1728B52AA6E4}">
+                <adec:decorative xmlns:adec="http://schemas.microsoft.com/office/drawing/2017/decorative" val="1"/>
+              </a:ext>
+            </a:extLst>
+          </p:cNvPr>
+          <p:cNvSpPr>
+            <a:spLocks noGrp="1" noRot="1" noChangeAspect="1" noMove="1" noResize="1" noEditPoints="1" noAdjustHandles="1" noChangeArrowheads="1" noChangeShapeType="1" noTextEdit="1"/>
+          </p:cNvSpPr>
+          <p:nvPr>
+            <p:extLst>
+              <p:ext uri="{386F3935-93C4-4BCD-93E2-E3B085C9AB24}">
+                <p16:designElem xmlns:p16="http://schemas.microsoft.com/office/powerpoint/2015/main" val="1"/>
+              </p:ext>
+            </p:extLst>
+          </p:nvPr>
+        </p:nvSpPr>
+        <p:spPr>
+          <a:xfrm>
+            <a:off x="0" y="0"/>
+            <a:ext cx="12192000" cy="6858000"/>
+          </a:xfrm>
+          <a:prstGeom prst="rect">
+            <a:avLst/>
+          </a:prstGeom>
+          <a:ln>
+            <a:noFill/>
+          </a:ln>
+        </p:spPr>
+        <p:style>
+          <a:lnRef idx="2">
+            <a:schemeClr val="accent1">
+              <a:shade val="50000"/>
+            </a:schemeClr>
+          </a:lnRef>
+          <a:fillRef idx="1">
+            <a:schemeClr val="accent1"/>
+          </a:fillRef>
+          <a:effectRef idx="0">
+            <a:schemeClr val="accent1"/>
+          </a:effectRef>
+          <a:fontRef idx="minor">
+            <a:schemeClr val="lt1"/>
+          </a:fontRef>
+        </p:style>
+        <p:txBody>
+          <a:bodyPr rtlCol="0" anchor="ctr"/>
+          <a:lstStyle/>
+          <a:p>
+            <a:pPr algn="ctr"/>
+            <a:endParaRPr lang="en-US" dirty="0"/>
+          </a:p>
+        </p:txBody>
+      </p:sp>
+      <p:pic>
+        <p:nvPicPr>
+          <p:cNvPr id="8" name="Content Placeholder 4" descr="Digital Numbers">
+            <a:extLst>
+              <a:ext uri="{FF2B5EF4-FFF2-40B4-BE49-F238E27FC236}">
+                <a16:creationId xmlns:a16="http://schemas.microsoft.com/office/drawing/2014/main" id="{EA70616B-E344-4856-8DF9-707C26236613}"/>
+              </a:ext>
+            </a:extLst>
+          </p:cNvPr>
+          <p:cNvPicPr>
+            <a:picLocks noChangeAspect="1"/>
+          </p:cNvPicPr>
+          <p:nvPr/>
+        </p:nvPicPr>
+        <p:blipFill rotWithShape="1">
+          <a:blip r:embed="rId3" cstate="screen">
+            <a:extLst>
+              <a:ext uri="{28A0092B-C50C-407E-A947-70E740481C1C}">
+                <a14:useLocalDpi xmlns:a14="http://schemas.microsoft.com/office/drawing/2010/main"/>
+              </a:ext>
+            </a:extLst>
+          </a:blip>
+          <a:srcRect t="10681" r="9091" b="12711"/>
+          <a:stretch/>
+        </p:blipFill>
+        <p:spPr>
+          <a:xfrm>
+            <a:off x="171785" y="76204"/>
+            <a:ext cx="12191980" cy="6857990"/>
+          </a:xfrm>
+          <a:prstGeom prst="rect">
+            <a:avLst/>
+          </a:prstGeom>
+        </p:spPr>
+      </p:pic>
+      <p:grpSp>
+        <p:nvGrpSpPr>
+          <p:cNvPr id="15" name="Group 14">
+            <a:extLst>
+              <a:ext uri="{FF2B5EF4-FFF2-40B4-BE49-F238E27FC236}">
+                <a16:creationId xmlns:a16="http://schemas.microsoft.com/office/drawing/2014/main" id="{D619FC33-16ED-4246-9596-BEFEB55E4CF6}"/>
+              </a:ext>
+              <a:ext uri="{C183D7F6-B498-43B3-948B-1728B52AA6E4}">
+                <adec:decorative xmlns:adec="http://schemas.microsoft.com/office/drawing/2017/decorative" val="1"/>
+              </a:ext>
+            </a:extLst>
+          </p:cNvPr>
+          <p:cNvGrpSpPr>
+            <a:grpSpLocks noGrp="1" noUngrp="1" noRot="1" noChangeAspect="1" noMove="1" noResize="1"/>
+          </p:cNvGrpSpPr>
+          <p:nvPr>
+            <p:extLst>
+              <p:ext uri="{386F3935-93C4-4BCD-93E2-E3B085C9AB24}">
+                <p16:designElem xmlns:p16="http://schemas.microsoft.com/office/powerpoint/2015/main" val="1"/>
+              </p:ext>
+            </p:extLst>
+          </p:nvPr>
+        </p:nvGrpSpPr>
+        <p:grpSpPr>
+          <a:xfrm>
+            <a:off x="438067" y="457200"/>
+            <a:ext cx="7507083" cy="5935132"/>
+            <a:chOff x="438067" y="457200"/>
+            <a:chExt cx="7507083" cy="5935132"/>
+          </a:xfrm>
+        </p:grpSpPr>
+        <p:sp>
+          <p:nvSpPr>
+            <p:cNvPr id="16" name="Rectangle 15">
+              <a:extLst>
+                <a:ext uri="{FF2B5EF4-FFF2-40B4-BE49-F238E27FC236}">
+                  <a16:creationId xmlns:a16="http://schemas.microsoft.com/office/drawing/2014/main" id="{2EEA80E1-F99F-4009-837F-2F72F8A5D580}"/>
+                </a:ext>
+                <a:ext uri="{C183D7F6-B498-43B3-948B-1728B52AA6E4}">
+                  <adec:decorative xmlns:adec="http://schemas.microsoft.com/office/drawing/2017/decorative" val="1"/>
+                </a:ext>
+              </a:extLst>
+            </p:cNvPr>
+            <p:cNvSpPr/>
+            <p:nvPr>
+              <p:extLst>
+                <p:ext uri="{386F3935-93C4-4BCD-93E2-E3B085C9AB24}">
+                  <p16:designElem xmlns:p16="http://schemas.microsoft.com/office/powerpoint/2015/main" val="1"/>
+                </p:ext>
+              </p:extLst>
+            </p:nvPr>
+          </p:nvSpPr>
+          <p:spPr>
+            <a:xfrm>
+              <a:off x="438067" y="618067"/>
+              <a:ext cx="7503665" cy="5774265"/>
+            </a:xfrm>
+            <a:prstGeom prst="rect">
+              <a:avLst/>
+            </a:prstGeom>
+            <a:solidFill>
+              <a:schemeClr val="accent1">
+                <a:alpha val="97000"/>
+              </a:schemeClr>
+            </a:solidFill>
+            <a:ln w="6350" cmpd="sng">
+              <a:noFill/>
+            </a:ln>
+            <a:effectLst/>
+          </p:spPr>
+          <p:style>
+            <a:lnRef idx="1">
+              <a:schemeClr val="accent1"/>
+            </a:lnRef>
+            <a:fillRef idx="3">
+              <a:schemeClr val="accent1"/>
+            </a:fillRef>
+            <a:effectRef idx="2">
+              <a:schemeClr val="accent1"/>
+            </a:effectRef>
+            <a:fontRef idx="minor">
+              <a:schemeClr val="lt1"/>
+            </a:fontRef>
+          </p:style>
+        </p:sp>
+        <p:sp>
+          <p:nvSpPr>
+            <p:cNvPr id="17" name="Rectangle 16">
+              <a:extLst>
+                <a:ext uri="{FF2B5EF4-FFF2-40B4-BE49-F238E27FC236}">
+                  <a16:creationId xmlns:a16="http://schemas.microsoft.com/office/drawing/2014/main" id="{0230AF9A-4641-4BD8-9F95-9607CD304039}"/>
+                </a:ext>
+                <a:ext uri="{C183D7F6-B498-43B3-948B-1728B52AA6E4}">
+                  <adec:decorative xmlns:adec="http://schemas.microsoft.com/office/drawing/2017/decorative" val="1"/>
+                </a:ext>
+              </a:extLst>
+            </p:cNvPr>
+            <p:cNvSpPr/>
+            <p:nvPr>
+              <p:extLst>
+                <p:ext uri="{386F3935-93C4-4BCD-93E2-E3B085C9AB24}">
+                  <p16:designElem xmlns:p16="http://schemas.microsoft.com/office/powerpoint/2015/main" val="1"/>
+                </p:ext>
+              </p:extLst>
+            </p:nvPr>
+          </p:nvSpPr>
+          <p:spPr>
+            <a:xfrm>
+              <a:off x="438068" y="457200"/>
+              <a:ext cx="3703320" cy="94997"/>
+            </a:xfrm>
+            <a:prstGeom prst="rect">
+              <a:avLst/>
+            </a:prstGeom>
+            <a:solidFill>
+              <a:schemeClr val="accent1"/>
+            </a:solidFill>
+            <a:ln>
+              <a:noFill/>
+            </a:ln>
+            <a:effectLst/>
+          </p:spPr>
+          <p:style>
+            <a:lnRef idx="1">
+              <a:schemeClr val="accent1"/>
+            </a:lnRef>
+            <a:fillRef idx="3">
+              <a:schemeClr val="accent1"/>
+            </a:fillRef>
+            <a:effectRef idx="2">
+              <a:schemeClr val="accent1"/>
+            </a:effectRef>
+            <a:fontRef idx="minor">
+              <a:schemeClr val="lt1"/>
+            </a:fontRef>
+          </p:style>
+        </p:sp>
+        <p:sp>
+          <p:nvSpPr>
+            <p:cNvPr id="18" name="Rectangle 17">
+              <a:extLst>
+                <a:ext uri="{FF2B5EF4-FFF2-40B4-BE49-F238E27FC236}">
+                  <a16:creationId xmlns:a16="http://schemas.microsoft.com/office/drawing/2014/main" id="{8703D4EC-9389-41B6-B88B-B6FDC8CD3330}"/>
+                </a:ext>
+                <a:ext uri="{C183D7F6-B498-43B3-948B-1728B52AA6E4}">
+                  <adec:decorative xmlns:adec="http://schemas.microsoft.com/office/drawing/2017/decorative" val="1"/>
+                </a:ext>
+              </a:extLst>
+            </p:cNvPr>
+            <p:cNvSpPr/>
+            <p:nvPr>
+              <p:extLst>
+                <p:ext uri="{386F3935-93C4-4BCD-93E2-E3B085C9AB24}">
+                  <p16:designElem xmlns:p16="http://schemas.microsoft.com/office/powerpoint/2015/main" val="1"/>
+                </p:ext>
+              </p:extLst>
+            </p:nvPr>
+          </p:nvSpPr>
+          <p:spPr>
+            <a:xfrm>
+              <a:off x="4241830" y="457200"/>
+              <a:ext cx="3703320" cy="91440"/>
+            </a:xfrm>
+            <a:prstGeom prst="rect">
+              <a:avLst/>
+            </a:prstGeom>
+            <a:solidFill>
+              <a:schemeClr val="accent2"/>
+            </a:solidFill>
+            <a:ln>
+              <a:noFill/>
+            </a:ln>
+            <a:effectLst/>
+          </p:spPr>
+          <p:style>
+            <a:lnRef idx="1">
+              <a:schemeClr val="accent1"/>
+            </a:lnRef>
+            <a:fillRef idx="3">
+              <a:schemeClr val="accent1"/>
+            </a:fillRef>
+            <a:effectRef idx="2">
+              <a:schemeClr val="accent1"/>
+            </a:effectRef>
+            <a:fontRef idx="minor">
+              <a:schemeClr val="lt1"/>
+            </a:fontRef>
+          </p:style>
+        </p:sp>
+      </p:grpSp>
+      <p:sp>
+        <p:nvSpPr>
+          <p:cNvPr id="2" name="Title 1">
+            <a:extLst>
+              <a:ext uri="{FF2B5EF4-FFF2-40B4-BE49-F238E27FC236}">
+                <a16:creationId xmlns:a16="http://schemas.microsoft.com/office/drawing/2014/main" id="{7F2616EE-270D-4F4C-BA1F-2708D387B800}"/>
+              </a:ext>
+            </a:extLst>
+          </p:cNvPr>
+          <p:cNvSpPr>
+            <a:spLocks noGrp="1"/>
+          </p:cNvSpPr>
+          <p:nvPr>
+            <p:ph type="title"/>
+          </p:nvPr>
+        </p:nvSpPr>
+        <p:spPr>
+          <a:xfrm>
+            <a:off x="584200" y="1006956"/>
+            <a:ext cx="7213600" cy="1121871"/>
+          </a:xfrm>
+        </p:spPr>
+        <p:txBody>
+          <a:bodyPr anchor="ctr">
+            <a:normAutofit/>
+          </a:bodyPr>
+          <a:lstStyle/>
+          <a:p>
+            <a:pPr algn="ctr"/>
+            <a:r>
+              <a:rPr lang="en-US" dirty="0"/>
+              <a:t>Algorithm with best outcomes</a:t>
+            </a:r>
+          </a:p>
+        </p:txBody>
+      </p:sp>
+      <p:graphicFrame>
+        <p:nvGraphicFramePr>
+          <p:cNvPr id="6" name="Content Placeholder 5" descr="SmartArt">
+            <a:extLst>
+              <a:ext uri="{FF2B5EF4-FFF2-40B4-BE49-F238E27FC236}">
+                <a16:creationId xmlns:a16="http://schemas.microsoft.com/office/drawing/2014/main" id="{BF629521-FFD2-45DA-9D1D-A5F09BD5A2D9}"/>
+              </a:ext>
+            </a:extLst>
+          </p:cNvPr>
+          <p:cNvGraphicFramePr>
+            <a:graphicFrameLocks noGrp="1"/>
+          </p:cNvGraphicFramePr>
+          <p:nvPr>
+            <p:ph idx="1"/>
+            <p:extLst>
+              <p:ext uri="{D42A27DB-BD31-4B8C-83A1-F6EECF244321}">
+                <p14:modId xmlns:p14="http://schemas.microsoft.com/office/powerpoint/2010/main" val="1658254405"/>
+              </p:ext>
+            </p:extLst>
+          </p:nvPr>
+        </p:nvGraphicFramePr>
+        <p:xfrm>
+          <a:off x="719571" y="2198254"/>
+          <a:ext cx="6854248" cy="3563938"/>
+        </p:xfrm>
+        <a:graphic>
+          <a:graphicData uri="http://schemas.openxmlformats.org/drawingml/2006/diagram">
+            <dgm:relIds xmlns:dgm="http://schemas.openxmlformats.org/drawingml/2006/diagram" xmlns:r="http://schemas.openxmlformats.org/officeDocument/2006/relationships" r:dm="rId4" r:lo="rId5" r:qs="rId6" r:cs="rId7"/>
+          </a:graphicData>
+        </a:graphic>
+      </p:graphicFrame>
+    </p:spTree>
+    <p:extLst>
+      <p:ext uri="{BB962C8B-B14F-4D97-AF65-F5344CB8AC3E}">
+        <p14:creationId xmlns:p14="http://schemas.microsoft.com/office/powerpoint/2010/main" val="4209322005"/>
+      </p:ext>
+    </p:extLst>
+  </p:cSld>
+  <p:clrMapOvr>
+    <a:masterClrMapping/>
+  </p:clrMapOvr>
+</p:sld>
+</file>
+
+<file path=ppt/slides/slide22.xml><?xml version="1.0" encoding="utf-8"?>
+<p:sld xmlns:a="http://schemas.openxmlformats.org/drawingml/2006/main" xmlns:r="http://schemas.openxmlformats.org/officeDocument/2006/relationships" xmlns:p="http://schemas.openxmlformats.org/presentationml/2006/main">
+  <p:cSld>
     <p:spTree>
       <p:nvGrpSpPr>
         <p:cNvPr id="1" name=""/>
@@ -32898,7 +33609,7 @@
 </p:sld>
 </file>
 
-<file path=ppt/slides/slide21.xml><?xml version="1.0" encoding="utf-8"?>
+<file path=ppt/slides/slide23.xml><?xml version="1.0" encoding="utf-8"?>
 <p:sld xmlns:a="http://schemas.openxmlformats.org/drawingml/2006/main" xmlns:r="http://schemas.openxmlformats.org/officeDocument/2006/relationships" xmlns:p="http://schemas.openxmlformats.org/presentationml/2006/main">
   <p:cSld>
     <p:bg>
@@ -35022,6 +35733,242 @@
 <file path=ppt/slides/slide6.xml><?xml version="1.0" encoding="utf-8"?>
 <p:sld xmlns:a="http://schemas.openxmlformats.org/drawingml/2006/main" xmlns:r="http://schemas.openxmlformats.org/officeDocument/2006/relationships" xmlns:p="http://schemas.openxmlformats.org/presentationml/2006/main">
   <p:cSld>
+    <p:spTree>
+      <p:nvGrpSpPr>
+        <p:cNvPr id="1" name=""/>
+        <p:cNvGrpSpPr/>
+        <p:nvPr/>
+      </p:nvGrpSpPr>
+      <p:grpSpPr>
+        <a:xfrm>
+          <a:off x="0" y="0"/>
+          <a:ext cx="0" cy="0"/>
+          <a:chOff x="0" y="0"/>
+          <a:chExt cx="0" cy="0"/>
+        </a:xfrm>
+      </p:grpSpPr>
+      <p:sp>
+        <p:nvSpPr>
+          <p:cNvPr id="2" name="Title 1">
+            <a:extLst>
+              <a:ext uri="{FF2B5EF4-FFF2-40B4-BE49-F238E27FC236}">
+                <a16:creationId xmlns:a16="http://schemas.microsoft.com/office/drawing/2014/main" id="{32160742-182B-4426-BF96-12807B0D92F0}"/>
+              </a:ext>
+            </a:extLst>
+          </p:cNvPr>
+          <p:cNvSpPr>
+            <a:spLocks noGrp="1"/>
+          </p:cNvSpPr>
+          <p:nvPr>
+            <p:ph type="title"/>
+          </p:nvPr>
+        </p:nvSpPr>
+        <p:spPr/>
+        <p:txBody>
+          <a:bodyPr/>
+          <a:lstStyle/>
+          <a:p>
+            <a:r>
+              <a:rPr lang="en-US" dirty="0"/>
+              <a:t>Chicago CRIME DATASET</a:t>
+            </a:r>
+          </a:p>
+        </p:txBody>
+      </p:sp>
+      <p:pic>
+        <p:nvPicPr>
+          <p:cNvPr id="7" name="Picture 6"/>
+          <p:cNvPicPr>
+            <a:picLocks noChangeAspect="1"/>
+          </p:cNvPicPr>
+          <p:nvPr/>
+        </p:nvPicPr>
+        <p:blipFill>
+          <a:blip r:embed="rId3">
+            <a:extLst>
+              <a:ext uri="{28A0092B-C50C-407E-A947-70E740481C1C}">
+                <a14:useLocalDpi xmlns:a14="http://schemas.microsoft.com/office/drawing/2010/main" val="0"/>
+              </a:ext>
+            </a:extLst>
+          </a:blip>
+          <a:stretch>
+            <a:fillRect/>
+          </a:stretch>
+        </p:blipFill>
+        <p:spPr>
+          <a:xfrm>
+            <a:off x="1121518" y="1945178"/>
+            <a:ext cx="4258636" cy="4708393"/>
+          </a:xfrm>
+          <a:prstGeom prst="rect">
+            <a:avLst/>
+          </a:prstGeom>
+        </p:spPr>
+      </p:pic>
+      <p:pic>
+        <p:nvPicPr>
+          <p:cNvPr id="11" name="Picture 10"/>
+          <p:cNvPicPr>
+            <a:picLocks noChangeAspect="1"/>
+          </p:cNvPicPr>
+          <p:nvPr/>
+        </p:nvPicPr>
+        <p:blipFill>
+          <a:blip r:embed="rId4">
+            <a:extLst>
+              <a:ext uri="{28A0092B-C50C-407E-A947-70E740481C1C}">
+                <a14:useLocalDpi xmlns:a14="http://schemas.microsoft.com/office/drawing/2010/main" val="0"/>
+              </a:ext>
+            </a:extLst>
+          </a:blip>
+          <a:stretch>
+            <a:fillRect/>
+          </a:stretch>
+        </p:blipFill>
+        <p:spPr>
+          <a:xfrm>
+            <a:off x="6254474" y="1883263"/>
+            <a:ext cx="4826391" cy="4916547"/>
+          </a:xfrm>
+          <a:prstGeom prst="rect">
+            <a:avLst/>
+          </a:prstGeom>
+        </p:spPr>
+      </p:pic>
+    </p:spTree>
+    <p:extLst>
+      <p:ext uri="{BB962C8B-B14F-4D97-AF65-F5344CB8AC3E}">
+        <p14:creationId xmlns:p14="http://schemas.microsoft.com/office/powerpoint/2010/main" val="34216441"/>
+      </p:ext>
+    </p:extLst>
+  </p:cSld>
+  <p:clrMapOvr>
+    <a:masterClrMapping/>
+  </p:clrMapOvr>
+</p:sld>
+</file>
+
+<file path=ppt/slides/slide7.xml><?xml version="1.0" encoding="utf-8"?>
+<p:sld xmlns:a="http://schemas.openxmlformats.org/drawingml/2006/main" xmlns:r="http://schemas.openxmlformats.org/officeDocument/2006/relationships" xmlns:p="http://schemas.openxmlformats.org/presentationml/2006/main">
+  <p:cSld>
+    <p:spTree>
+      <p:nvGrpSpPr>
+        <p:cNvPr id="1" name=""/>
+        <p:cNvGrpSpPr/>
+        <p:nvPr/>
+      </p:nvGrpSpPr>
+      <p:grpSpPr>
+        <a:xfrm>
+          <a:off x="0" y="0"/>
+          <a:ext cx="0" cy="0"/>
+          <a:chOff x="0" y="0"/>
+          <a:chExt cx="0" cy="0"/>
+        </a:xfrm>
+      </p:grpSpPr>
+      <p:sp>
+        <p:nvSpPr>
+          <p:cNvPr id="2" name="Title 1">
+            <a:extLst>
+              <a:ext uri="{FF2B5EF4-FFF2-40B4-BE49-F238E27FC236}">
+                <a16:creationId xmlns:a16="http://schemas.microsoft.com/office/drawing/2014/main" id="{32160742-182B-4426-BF96-12807B0D92F0}"/>
+              </a:ext>
+            </a:extLst>
+          </p:cNvPr>
+          <p:cNvSpPr>
+            <a:spLocks noGrp="1"/>
+          </p:cNvSpPr>
+          <p:nvPr>
+            <p:ph type="title"/>
+          </p:nvPr>
+        </p:nvSpPr>
+        <p:spPr/>
+        <p:txBody>
+          <a:bodyPr/>
+          <a:lstStyle/>
+          <a:p>
+            <a:r>
+              <a:rPr lang="en-US" dirty="0"/>
+              <a:t>Chicago CRIME DATASET</a:t>
+            </a:r>
+          </a:p>
+        </p:txBody>
+      </p:sp>
+      <p:pic>
+        <p:nvPicPr>
+          <p:cNvPr id="9" name="Picture 8"/>
+          <p:cNvPicPr>
+            <a:picLocks noChangeAspect="1"/>
+          </p:cNvPicPr>
+          <p:nvPr/>
+        </p:nvPicPr>
+        <p:blipFill>
+          <a:blip r:embed="rId3">
+            <a:extLst>
+              <a:ext uri="{28A0092B-C50C-407E-A947-70E740481C1C}">
+                <a14:useLocalDpi xmlns:a14="http://schemas.microsoft.com/office/drawing/2010/main" val="0"/>
+              </a:ext>
+            </a:extLst>
+          </a:blip>
+          <a:stretch>
+            <a:fillRect/>
+          </a:stretch>
+        </p:blipFill>
+        <p:spPr>
+          <a:xfrm>
+            <a:off x="1313968" y="1920239"/>
+            <a:ext cx="4228561" cy="4675142"/>
+          </a:xfrm>
+          <a:prstGeom prst="rect">
+            <a:avLst/>
+          </a:prstGeom>
+        </p:spPr>
+      </p:pic>
+      <p:pic>
+        <p:nvPicPr>
+          <p:cNvPr id="4" name="Picture 3"/>
+          <p:cNvPicPr>
+            <a:picLocks noChangeAspect="1"/>
+          </p:cNvPicPr>
+          <p:nvPr/>
+        </p:nvPicPr>
+        <p:blipFill>
+          <a:blip r:embed="rId4">
+            <a:extLst>
+              <a:ext uri="{28A0092B-C50C-407E-A947-70E740481C1C}">
+                <a14:useLocalDpi xmlns:a14="http://schemas.microsoft.com/office/drawing/2010/main" val="0"/>
+              </a:ext>
+            </a:extLst>
+          </a:blip>
+          <a:stretch>
+            <a:fillRect/>
+          </a:stretch>
+        </p:blipFill>
+        <p:spPr>
+          <a:xfrm>
+            <a:off x="6254134" y="1867282"/>
+            <a:ext cx="4335658" cy="4781055"/>
+          </a:xfrm>
+          <a:prstGeom prst="rect">
+            <a:avLst/>
+          </a:prstGeom>
+        </p:spPr>
+      </p:pic>
+    </p:spTree>
+    <p:extLst>
+      <p:ext uri="{BB962C8B-B14F-4D97-AF65-F5344CB8AC3E}">
+        <p14:creationId xmlns:p14="http://schemas.microsoft.com/office/powerpoint/2010/main" val="4043830155"/>
+      </p:ext>
+    </p:extLst>
+  </p:cSld>
+  <p:clrMapOvr>
+    <a:masterClrMapping/>
+  </p:clrMapOvr>
+</p:sld>
+</file>
+
+<file path=ppt/slides/slide8.xml><?xml version="1.0" encoding="utf-8"?>
+<p:sld xmlns:a="http://schemas.openxmlformats.org/drawingml/2006/main" xmlns:r="http://schemas.openxmlformats.org/officeDocument/2006/relationships" xmlns:p="http://schemas.openxmlformats.org/presentationml/2006/main">
+  <p:cSld>
     <p:bg>
       <p:bgPr>
         <a:solidFill>
@@ -35343,7 +36290,7 @@
 </p:sld>
 </file>
 
-<file path=ppt/slides/slide7.xml><?xml version="1.0" encoding="utf-8"?>
+<file path=ppt/slides/slide9.xml><?xml version="1.0" encoding="utf-8"?>
 <p:sld xmlns:a="http://schemas.openxmlformats.org/drawingml/2006/main" xmlns:r="http://schemas.openxmlformats.org/officeDocument/2006/relationships" xmlns:p="http://schemas.openxmlformats.org/presentationml/2006/main">
   <p:cSld>
     <p:bg>
@@ -35900,570 +36847,6 @@
   </p:cSld>
   <p:clrMapOvr>
     <a:overrideClrMapping bg1="lt1" tx1="dk1" bg2="lt2" tx2="dk2" accent1="accent1" accent2="accent2" accent3="accent3" accent4="accent4" accent5="accent5" accent6="accent6" hlink="hlink" folHlink="folHlink"/>
-  </p:clrMapOvr>
-</p:sld>
-</file>
-
-<file path=ppt/slides/slide8.xml><?xml version="1.0" encoding="utf-8"?>
-<p:sld xmlns:a="http://schemas.openxmlformats.org/drawingml/2006/main" xmlns:r="http://schemas.openxmlformats.org/officeDocument/2006/relationships" xmlns:p="http://schemas.openxmlformats.org/presentationml/2006/main">
-  <p:cSld>
-    <p:bg>
-      <p:bgPr>
-        <a:solidFill>
-          <a:schemeClr val="bg1"/>
-        </a:solidFill>
-        <a:effectLst/>
-      </p:bgPr>
-    </p:bg>
-    <p:spTree>
-      <p:nvGrpSpPr>
-        <p:cNvPr id="1" name=""/>
-        <p:cNvGrpSpPr/>
-        <p:nvPr/>
-      </p:nvGrpSpPr>
-      <p:grpSpPr>
-        <a:xfrm>
-          <a:off x="0" y="0"/>
-          <a:ext cx="0" cy="0"/>
-          <a:chOff x="0" y="0"/>
-          <a:chExt cx="0" cy="0"/>
-        </a:xfrm>
-      </p:grpSpPr>
-      <p:sp>
-        <p:nvSpPr>
-          <p:cNvPr id="2" name="Title 1">
-            <a:extLst>
-              <a:ext uri="{FF2B5EF4-FFF2-40B4-BE49-F238E27FC236}">
-                <a16:creationId xmlns:a16="http://schemas.microsoft.com/office/drawing/2014/main" id="{5B040558-A365-4CCE-92FA-5A48CD98F9C9}"/>
-              </a:ext>
-            </a:extLst>
-          </p:cNvPr>
-          <p:cNvSpPr>
-            <a:spLocks noGrp="1"/>
-          </p:cNvSpPr>
-          <p:nvPr>
-            <p:ph type="title"/>
-          </p:nvPr>
-        </p:nvSpPr>
-        <p:spPr>
-          <a:xfrm>
-            <a:off x="581192" y="702156"/>
-            <a:ext cx="11029616" cy="1013800"/>
-          </a:xfrm>
-        </p:spPr>
-        <p:txBody>
-          <a:bodyPr>
-            <a:normAutofit/>
-          </a:bodyPr>
-          <a:lstStyle/>
-          <a:p>
-            <a:r>
-              <a:rPr lang="en-US" sz="2800">
-                <a:solidFill>
-                  <a:srgbClr val="FFFEFF"/>
-                </a:solidFill>
-              </a:rPr>
-              <a:t>Machine learning workflow</a:t>
-            </a:r>
-          </a:p>
-        </p:txBody>
-      </p:sp>
-      <p:graphicFrame>
-        <p:nvGraphicFramePr>
-          <p:cNvPr id="26" name="Content Placeholder 3" descr="icon SmartArt graphic">
-            <a:extLst>
-              <a:ext uri="{FF2B5EF4-FFF2-40B4-BE49-F238E27FC236}">
-                <a16:creationId xmlns:a16="http://schemas.microsoft.com/office/drawing/2014/main" id="{81E592E1-99DF-4294-A2E9-EF46299BD3F4}"/>
-              </a:ext>
-            </a:extLst>
-          </p:cNvPr>
-          <p:cNvGraphicFramePr>
-            <a:graphicFrameLocks noGrp="1"/>
-          </p:cNvGraphicFramePr>
-          <p:nvPr>
-            <p:ph idx="4294967295"/>
-          </p:nvPr>
-        </p:nvGraphicFramePr>
-        <p:xfrm>
-          <a:off x="535558" y="2181225"/>
-          <a:ext cx="11029950" cy="3678238"/>
-        </p:xfrm>
-        <a:graphic>
-          <a:graphicData uri="http://schemas.openxmlformats.org/drawingml/2006/diagram">
-            <dgm:relIds xmlns:dgm="http://schemas.openxmlformats.org/drawingml/2006/diagram" xmlns:r="http://schemas.openxmlformats.org/officeDocument/2006/relationships" r:dm="rId3" r:lo="rId4" r:qs="rId5" r:cs="rId6"/>
-          </a:graphicData>
-        </a:graphic>
-      </p:graphicFrame>
-      <p:sp>
-        <p:nvSpPr>
-          <p:cNvPr id="29" name="Arrow: Right 28">
-            <a:extLst>
-              <a:ext uri="{FF2B5EF4-FFF2-40B4-BE49-F238E27FC236}">
-                <a16:creationId xmlns:a16="http://schemas.microsoft.com/office/drawing/2014/main" id="{36F11D05-2C77-4974-B7BB-ECEEAC258A39}"/>
-              </a:ext>
-            </a:extLst>
-          </p:cNvPr>
-          <p:cNvSpPr/>
-          <p:nvPr/>
-        </p:nvSpPr>
-        <p:spPr>
-          <a:xfrm>
-            <a:off x="4863880" y="3307500"/>
-            <a:ext cx="261596" cy="243000"/>
-          </a:xfrm>
-          <a:prstGeom prst="rightArrow">
-            <a:avLst>
-              <a:gd name="adj1" fmla="val 50000"/>
-              <a:gd name="adj2" fmla="val 50000"/>
-            </a:avLst>
-          </a:prstGeom>
-        </p:spPr>
-        <p:style>
-          <a:lnRef idx="0">
-            <a:schemeClr val="lt1">
-              <a:hueOff val="0"/>
-              <a:satOff val="0"/>
-              <a:lumOff val="0"/>
-              <a:alphaOff val="0"/>
-            </a:schemeClr>
-          </a:lnRef>
-          <a:fillRef idx="3">
-            <a:schemeClr val="accent3">
-              <a:hueOff val="0"/>
-              <a:satOff val="0"/>
-              <a:lumOff val="0"/>
-              <a:alphaOff val="0"/>
-            </a:schemeClr>
-          </a:fillRef>
-          <a:effectRef idx="2">
-            <a:schemeClr val="accent3">
-              <a:hueOff val="0"/>
-              <a:satOff val="0"/>
-              <a:lumOff val="0"/>
-              <a:alphaOff val="0"/>
-            </a:schemeClr>
-          </a:effectRef>
-          <a:fontRef idx="minor">
-            <a:schemeClr val="lt1"/>
-          </a:fontRef>
-        </p:style>
-      </p:sp>
-      <p:sp>
-        <p:nvSpPr>
-          <p:cNvPr id="33" name="Arrow: Right 32">
-            <a:extLst>
-              <a:ext uri="{FF2B5EF4-FFF2-40B4-BE49-F238E27FC236}">
-                <a16:creationId xmlns:a16="http://schemas.microsoft.com/office/drawing/2014/main" id="{6FC6D7CB-3AE7-41F7-93F6-A6426CBB1BFB}"/>
-              </a:ext>
-            </a:extLst>
-          </p:cNvPr>
-          <p:cNvSpPr/>
-          <p:nvPr/>
-        </p:nvSpPr>
-        <p:spPr>
-          <a:xfrm>
-            <a:off x="2737858" y="3343706"/>
-            <a:ext cx="261596" cy="243000"/>
-          </a:xfrm>
-          <a:prstGeom prst="rightArrow">
-            <a:avLst>
-              <a:gd name="adj1" fmla="val 50000"/>
-              <a:gd name="adj2" fmla="val 50000"/>
-            </a:avLst>
-          </a:prstGeom>
-        </p:spPr>
-        <p:style>
-          <a:lnRef idx="0">
-            <a:schemeClr val="lt1">
-              <a:hueOff val="0"/>
-              <a:satOff val="0"/>
-              <a:lumOff val="0"/>
-              <a:alphaOff val="0"/>
-            </a:schemeClr>
-          </a:lnRef>
-          <a:fillRef idx="3">
-            <a:schemeClr val="accent3">
-              <a:hueOff val="0"/>
-              <a:satOff val="0"/>
-              <a:lumOff val="0"/>
-              <a:alphaOff val="0"/>
-            </a:schemeClr>
-          </a:fillRef>
-          <a:effectRef idx="2">
-            <a:schemeClr val="accent3">
-              <a:hueOff val="0"/>
-              <a:satOff val="0"/>
-              <a:lumOff val="0"/>
-              <a:alphaOff val="0"/>
-            </a:schemeClr>
-          </a:effectRef>
-          <a:fontRef idx="minor">
-            <a:schemeClr val="lt1"/>
-          </a:fontRef>
-        </p:style>
-      </p:sp>
-      <p:sp>
-        <p:nvSpPr>
-          <p:cNvPr id="34" name="Arrow: Right 33">
-            <a:extLst>
-              <a:ext uri="{FF2B5EF4-FFF2-40B4-BE49-F238E27FC236}">
-                <a16:creationId xmlns:a16="http://schemas.microsoft.com/office/drawing/2014/main" id="{B4920B7A-0E5E-4517-AA7C-70EF8EFE25F6}"/>
-              </a:ext>
-            </a:extLst>
-          </p:cNvPr>
-          <p:cNvSpPr/>
-          <p:nvPr/>
-        </p:nvSpPr>
-        <p:spPr>
-          <a:xfrm>
-            <a:off x="6993217" y="3296387"/>
-            <a:ext cx="261596" cy="243000"/>
-          </a:xfrm>
-          <a:prstGeom prst="rightArrow">
-            <a:avLst>
-              <a:gd name="adj1" fmla="val 50000"/>
-              <a:gd name="adj2" fmla="val 50000"/>
-            </a:avLst>
-          </a:prstGeom>
-        </p:spPr>
-        <p:style>
-          <a:lnRef idx="0">
-            <a:schemeClr val="lt1">
-              <a:hueOff val="0"/>
-              <a:satOff val="0"/>
-              <a:lumOff val="0"/>
-              <a:alphaOff val="0"/>
-            </a:schemeClr>
-          </a:lnRef>
-          <a:fillRef idx="3">
-            <a:schemeClr val="accent3">
-              <a:hueOff val="0"/>
-              <a:satOff val="0"/>
-              <a:lumOff val="0"/>
-              <a:alphaOff val="0"/>
-            </a:schemeClr>
-          </a:fillRef>
-          <a:effectRef idx="2">
-            <a:schemeClr val="accent3">
-              <a:hueOff val="0"/>
-              <a:satOff val="0"/>
-              <a:lumOff val="0"/>
-              <a:alphaOff val="0"/>
-            </a:schemeClr>
-          </a:effectRef>
-          <a:fontRef idx="minor">
-            <a:schemeClr val="lt1"/>
-          </a:fontRef>
-        </p:style>
-      </p:sp>
-      <p:sp>
-        <p:nvSpPr>
-          <p:cNvPr id="35" name="Arrow: Right 34">
-            <a:extLst>
-              <a:ext uri="{FF2B5EF4-FFF2-40B4-BE49-F238E27FC236}">
-                <a16:creationId xmlns:a16="http://schemas.microsoft.com/office/drawing/2014/main" id="{B3A327B9-ADE3-4AD6-ACE4-27C1DAAC679E}"/>
-              </a:ext>
-            </a:extLst>
-          </p:cNvPr>
-          <p:cNvSpPr/>
-          <p:nvPr/>
-        </p:nvSpPr>
-        <p:spPr>
-          <a:xfrm>
-            <a:off x="8991756" y="3232143"/>
-            <a:ext cx="261596" cy="243000"/>
-          </a:xfrm>
-          <a:prstGeom prst="rightArrow">
-            <a:avLst>
-              <a:gd name="adj1" fmla="val 50000"/>
-              <a:gd name="adj2" fmla="val 50000"/>
-            </a:avLst>
-          </a:prstGeom>
-        </p:spPr>
-        <p:style>
-          <a:lnRef idx="0">
-            <a:schemeClr val="lt1">
-              <a:hueOff val="0"/>
-              <a:satOff val="0"/>
-              <a:lumOff val="0"/>
-              <a:alphaOff val="0"/>
-            </a:schemeClr>
-          </a:lnRef>
-          <a:fillRef idx="3">
-            <a:schemeClr val="accent3">
-              <a:hueOff val="0"/>
-              <a:satOff val="0"/>
-              <a:lumOff val="0"/>
-              <a:alphaOff val="0"/>
-            </a:schemeClr>
-          </a:fillRef>
-          <a:effectRef idx="2">
-            <a:schemeClr val="accent3">
-              <a:hueOff val="0"/>
-              <a:satOff val="0"/>
-              <a:lumOff val="0"/>
-              <a:alphaOff val="0"/>
-            </a:schemeClr>
-          </a:effectRef>
-          <a:fontRef idx="minor">
-            <a:schemeClr val="lt1"/>
-          </a:fontRef>
-        </p:style>
-      </p:sp>
-    </p:spTree>
-    <p:extLst>
-      <p:ext uri="{BB962C8B-B14F-4D97-AF65-F5344CB8AC3E}">
-        <p14:creationId xmlns:p14="http://schemas.microsoft.com/office/powerpoint/2010/main" val="1060920759"/>
-      </p:ext>
-    </p:extLst>
-  </p:cSld>
-  <p:clrMapOvr>
-    <a:masterClrMapping/>
-  </p:clrMapOvr>
-</p:sld>
-</file>
-
-<file path=ppt/slides/slide9.xml><?xml version="1.0" encoding="utf-8"?>
-<p:sld xmlns:a="http://schemas.openxmlformats.org/drawingml/2006/main" xmlns:r="http://schemas.openxmlformats.org/officeDocument/2006/relationships" xmlns:p="http://schemas.openxmlformats.org/presentationml/2006/main">
-  <p:cSld>
-    <p:spTree>
-      <p:nvGrpSpPr>
-        <p:cNvPr id="1" name=""/>
-        <p:cNvGrpSpPr/>
-        <p:nvPr/>
-      </p:nvGrpSpPr>
-      <p:grpSpPr>
-        <a:xfrm>
-          <a:off x="0" y="0"/>
-          <a:ext cx="0" cy="0"/>
-          <a:chOff x="0" y="0"/>
-          <a:chExt cx="0" cy="0"/>
-        </a:xfrm>
-      </p:grpSpPr>
-      <p:sp>
-        <p:nvSpPr>
-          <p:cNvPr id="2" name="Title 1">
-            <a:extLst>
-              <a:ext uri="{FF2B5EF4-FFF2-40B4-BE49-F238E27FC236}">
-                <a16:creationId xmlns:a16="http://schemas.microsoft.com/office/drawing/2014/main" id="{5B040558-A365-4CCE-92FA-5A48CD98F9C9}"/>
-              </a:ext>
-            </a:extLst>
-          </p:cNvPr>
-          <p:cNvSpPr>
-            <a:spLocks noGrp="1"/>
-          </p:cNvSpPr>
-          <p:nvPr>
-            <p:ph type="title"/>
-          </p:nvPr>
-        </p:nvSpPr>
-        <p:spPr>
-          <a:xfrm>
-            <a:off x="581192" y="702156"/>
-            <a:ext cx="11029616" cy="1013800"/>
-          </a:xfrm>
-        </p:spPr>
-        <p:txBody>
-          <a:bodyPr>
-            <a:normAutofit/>
-          </a:bodyPr>
-          <a:lstStyle/>
-          <a:p>
-            <a:r>
-              <a:rPr lang="en-US" sz="2800">
-                <a:solidFill>
-                  <a:srgbClr val="FFFEFF"/>
-                </a:solidFill>
-              </a:rPr>
-              <a:t>Machine learning workflow</a:t>
-            </a:r>
-          </a:p>
-        </p:txBody>
-      </p:sp>
-      <p:graphicFrame>
-        <p:nvGraphicFramePr>
-          <p:cNvPr id="26" name="Content Placeholder 3" descr="icon SmartArt graphic">
-            <a:extLst>
-              <a:ext uri="{FF2B5EF4-FFF2-40B4-BE49-F238E27FC236}">
-                <a16:creationId xmlns:a16="http://schemas.microsoft.com/office/drawing/2014/main" id="{81E592E1-99DF-4294-A2E9-EF46299BD3F4}"/>
-              </a:ext>
-            </a:extLst>
-          </p:cNvPr>
-          <p:cNvGraphicFramePr>
-            <a:graphicFrameLocks noGrp="1"/>
-          </p:cNvGraphicFramePr>
-          <p:nvPr>
-            <p:ph idx="4294967295"/>
-            <p:extLst>
-              <p:ext uri="{D42A27DB-BD31-4B8C-83A1-F6EECF244321}">
-                <p14:modId xmlns:p14="http://schemas.microsoft.com/office/powerpoint/2010/main" val="2948299104"/>
-              </p:ext>
-            </p:extLst>
-          </p:nvPr>
-        </p:nvGraphicFramePr>
-        <p:xfrm>
-          <a:off x="581025" y="2181225"/>
-          <a:ext cx="4339558" cy="3678238"/>
-        </p:xfrm>
-        <a:graphic>
-          <a:graphicData uri="http://schemas.openxmlformats.org/drawingml/2006/diagram">
-            <dgm:relIds xmlns:dgm="http://schemas.openxmlformats.org/drawingml/2006/diagram" xmlns:r="http://schemas.openxmlformats.org/officeDocument/2006/relationships" r:dm="rId3" r:lo="rId4" r:qs="rId5" r:cs="rId6"/>
-          </a:graphicData>
-        </a:graphic>
-      </p:graphicFrame>
-      <p:sp>
-        <p:nvSpPr>
-          <p:cNvPr id="5" name="TextBox 4">
-            <a:extLst>
-              <a:ext uri="{FF2B5EF4-FFF2-40B4-BE49-F238E27FC236}">
-                <a16:creationId xmlns:a16="http://schemas.microsoft.com/office/drawing/2014/main" id="{E70F6769-B81F-4D31-B679-B02EE3C2198A}"/>
-              </a:ext>
-            </a:extLst>
-          </p:cNvPr>
-          <p:cNvSpPr txBox="1"/>
-          <p:nvPr/>
-        </p:nvSpPr>
-        <p:spPr>
-          <a:xfrm>
-            <a:off x="4920583" y="2723121"/>
-            <a:ext cx="5693529" cy="2194447"/>
-          </a:xfrm>
-          <a:prstGeom prst="rect">
-            <a:avLst/>
-          </a:prstGeom>
-          <a:noFill/>
-        </p:spPr>
-        <p:txBody>
-          <a:bodyPr wrap="square" rtlCol="0">
-            <a:spAutoFit/>
-          </a:bodyPr>
-          <a:lstStyle/>
-          <a:p>
-            <a:pPr marL="630000" lvl="1" indent="-306000">
-              <a:lnSpc>
-                <a:spcPct val="80000"/>
-              </a:lnSpc>
-              <a:spcBef>
-                <a:spcPct val="20000"/>
-              </a:spcBef>
-              <a:spcAft>
-                <a:spcPts val="600"/>
-              </a:spcAft>
-              <a:buClr>
-                <a:schemeClr val="accent2"/>
-              </a:buClr>
-              <a:buSzPct val="92000"/>
-              <a:buFont typeface="Wingdings 2" panose="05020102010507070707" pitchFamily="18" charset="2"/>
-              <a:buChar char=""/>
-            </a:pPr>
-            <a:r>
-              <a:rPr lang="en-US" sz="3200" dirty="0">
-                <a:solidFill>
-                  <a:schemeClr val="tx2"/>
-                </a:solidFill>
-                <a:latin typeface="Times New Roman" panose="02020603050405020304" pitchFamily="18" charset="0"/>
-                <a:cs typeface="Times New Roman" panose="02020603050405020304" pitchFamily="18" charset="0"/>
-              </a:rPr>
-              <a:t>Naïve Bayes</a:t>
-            </a:r>
-          </a:p>
-          <a:p>
-            <a:pPr marL="630000" lvl="1" indent="-306000">
-              <a:lnSpc>
-                <a:spcPct val="80000"/>
-              </a:lnSpc>
-              <a:spcBef>
-                <a:spcPct val="20000"/>
-              </a:spcBef>
-              <a:spcAft>
-                <a:spcPts val="600"/>
-              </a:spcAft>
-              <a:buClr>
-                <a:schemeClr val="accent2"/>
-              </a:buClr>
-              <a:buSzPct val="92000"/>
-              <a:buFont typeface="Wingdings 2" panose="05020102010507070707" pitchFamily="18" charset="2"/>
-              <a:buChar char=""/>
-            </a:pPr>
-            <a:r>
-              <a:rPr lang="en-US" sz="3200" dirty="0">
-                <a:solidFill>
-                  <a:schemeClr val="tx2"/>
-                </a:solidFill>
-                <a:latin typeface="Times New Roman" panose="02020603050405020304" pitchFamily="18" charset="0"/>
-                <a:cs typeface="Times New Roman" panose="02020603050405020304" pitchFamily="18" charset="0"/>
-              </a:rPr>
-              <a:t>Random Forest</a:t>
-            </a:r>
-          </a:p>
-          <a:p>
-            <a:pPr marL="630000" lvl="1" indent="-306000">
-              <a:lnSpc>
-                <a:spcPct val="80000"/>
-              </a:lnSpc>
-              <a:spcBef>
-                <a:spcPct val="20000"/>
-              </a:spcBef>
-              <a:spcAft>
-                <a:spcPts val="600"/>
-              </a:spcAft>
-              <a:buClr>
-                <a:schemeClr val="accent2"/>
-              </a:buClr>
-              <a:buSzPct val="92000"/>
-              <a:buFont typeface="Wingdings 2" panose="05020102010507070707" pitchFamily="18" charset="2"/>
-              <a:buChar char=""/>
-            </a:pPr>
-            <a:r>
-              <a:rPr lang="en-US" sz="3200" dirty="0">
-                <a:solidFill>
-                  <a:schemeClr val="tx2"/>
-                </a:solidFill>
-                <a:latin typeface="Times New Roman" panose="02020603050405020304" pitchFamily="18" charset="0"/>
-                <a:cs typeface="Times New Roman" panose="02020603050405020304" pitchFamily="18" charset="0"/>
-              </a:rPr>
-              <a:t>Decision Tree</a:t>
-            </a:r>
-          </a:p>
-          <a:p>
-            <a:pPr marL="630000" lvl="1" indent="-306000">
-              <a:lnSpc>
-                <a:spcPct val="80000"/>
-              </a:lnSpc>
-              <a:spcBef>
-                <a:spcPct val="20000"/>
-              </a:spcBef>
-              <a:spcAft>
-                <a:spcPts val="600"/>
-              </a:spcAft>
-              <a:buClr>
-                <a:schemeClr val="accent2"/>
-              </a:buClr>
-              <a:buSzPct val="92000"/>
-              <a:buFont typeface="Wingdings 2" panose="05020102010507070707" pitchFamily="18" charset="2"/>
-              <a:buChar char=""/>
-            </a:pPr>
-            <a:r>
-              <a:rPr lang="en-US" sz="3200" dirty="0">
-                <a:solidFill>
-                  <a:schemeClr val="tx2"/>
-                </a:solidFill>
-                <a:latin typeface="Times New Roman" panose="02020603050405020304" pitchFamily="18" charset="0"/>
-                <a:cs typeface="Times New Roman" panose="02020603050405020304" pitchFamily="18" charset="0"/>
-              </a:rPr>
-              <a:t>Logistic Regression</a:t>
-            </a:r>
-          </a:p>
-        </p:txBody>
-      </p:sp>
-    </p:spTree>
-    <p:extLst>
-      <p:ext uri="{BB962C8B-B14F-4D97-AF65-F5344CB8AC3E}">
-        <p14:creationId xmlns:p14="http://schemas.microsoft.com/office/powerpoint/2010/main" val="2788682890"/>
-      </p:ext>
-    </p:extLst>
-  </p:cSld>
-  <p:clrMapOvr>
-    <a:masterClrMapping/>
   </p:clrMapOvr>
 </p:sld>
 </file>
@@ -37371,6 +37754,15 @@
 </file>
 
 <file path=customXml/item1.xml><?xml version="1.0" encoding="utf-8"?>
+<?mso-contentType ?>
+<FormTemplates xmlns="http://schemas.microsoft.com/sharepoint/v3/contenttype/forms">
+  <Display>DocumentLibraryForm</Display>
+  <Edit>DocumentLibraryForm</Edit>
+  <New>DocumentLibraryForm</New>
+</FormTemplates>
+</file>
+
+<file path=customXml/item2.xml><?xml version="1.0" encoding="utf-8"?>
 <ct:contentTypeSchema xmlns:ct="http://schemas.microsoft.com/office/2006/metadata/contentType" xmlns:ma="http://schemas.microsoft.com/office/2006/metadata/properties/metaAttributes" ct:_="" ma:_="" ma:contentTypeName="Document" ma:contentTypeID="0x01010079F111ED35F8CC479449609E8A0923A6" ma:contentTypeVersion="12" ma:contentTypeDescription="Create a new document." ma:contentTypeScope="" ma:versionID="b385d60f68dd989dca1fdc827799d853">
   <xsd:schema xmlns:xsd="http://www.w3.org/2001/XMLSchema" xmlns:xs="http://www.w3.org/2001/XMLSchema" xmlns:p="http://schemas.microsoft.com/office/2006/metadata/properties" xmlns:ns2="71af3243-3dd4-4a8d-8c0d-dd76da1f02a5" xmlns:ns3="16c05727-aa75-4e4a-9b5f-8a80a1165891" targetNamespace="http://schemas.microsoft.com/office/2006/metadata/properties" ma:root="true" ma:fieldsID="1911b479caf7b199da365455750e4572" ns2:_="" ns3:_="">
     <xsd:import namespace="71af3243-3dd4-4a8d-8c0d-dd76da1f02a5"/>
@@ -37591,7 +37983,7 @@
 </ct:contentTypeSchema>
 </file>
 
-<file path=customXml/item2.xml><?xml version="1.0" encoding="utf-8"?>
+<file path=customXml/item3.xml><?xml version="1.0" encoding="utf-8"?>
 <p:properties xmlns:p="http://schemas.microsoft.com/office/2006/metadata/properties" xmlns:xsi="http://www.w3.org/2001/XMLSchema-instance" xmlns:pc="http://schemas.microsoft.com/office/infopath/2007/PartnerControls">
   <documentManagement>
     <MediaServiceKeyPoints xmlns="71af3243-3dd4-4a8d-8c0d-dd76da1f02a5" xsi:nil="true"/>
@@ -37600,16 +37992,15 @@
 </p:properties>
 </file>
 
-<file path=customXml/item3.xml><?xml version="1.0" encoding="utf-8"?>
-<?mso-contentType ?>
-<FormTemplates xmlns="http://schemas.microsoft.com/sharepoint/v3/contenttype/forms">
-  <Display>DocumentLibraryForm</Display>
-  <Edit>DocumentLibraryForm</Edit>
-  <New>DocumentLibraryForm</New>
-</FormTemplates>
+<file path=customXml/itemProps1.xml><?xml version="1.0" encoding="utf-8"?>
+<ds:datastoreItem xmlns:ds="http://schemas.openxmlformats.org/officeDocument/2006/customXml" ds:itemID="{E3FC8A1C-A436-42C0-AC33-FAFFFAF219BC}">
+  <ds:schemaRefs>
+    <ds:schemaRef ds:uri="http://schemas.microsoft.com/sharepoint/v3/contenttype/forms"/>
+  </ds:schemaRefs>
+</ds:datastoreItem>
 </file>
 
-<file path=customXml/itemProps1.xml><?xml version="1.0" encoding="utf-8"?>
+<file path=customXml/itemProps2.xml><?xml version="1.0" encoding="utf-8"?>
 <ds:datastoreItem xmlns:ds="http://schemas.openxmlformats.org/officeDocument/2006/customXml" ds:itemID="{E3852F5D-AAE7-473B-9767-8875B60BC63B}">
   <ds:schemaRefs>
     <ds:schemaRef ds:uri="http://schemas.microsoft.com/office/2006/metadata/contentType"/>
@@ -37628,27 +38019,19 @@
 </ds:datastoreItem>
 </file>
 
-<file path=customXml/itemProps2.xml><?xml version="1.0" encoding="utf-8"?>
+<file path=customXml/itemProps3.xml><?xml version="1.0" encoding="utf-8"?>
 <ds:datastoreItem xmlns:ds="http://schemas.openxmlformats.org/officeDocument/2006/customXml" ds:itemID="{FF5C8BF1-B0E4-49A1-808F-40F2AD30E743}">
   <ds:schemaRefs>
+    <ds:schemaRef ds:uri="http://purl.org/dc/dcmitype/"/>
+    <ds:schemaRef ds:uri="http://schemas.openxmlformats.org/package/2006/metadata/core-properties"/>
+    <ds:schemaRef ds:uri="16c05727-aa75-4e4a-9b5f-8a80a1165891"/>
+    <ds:schemaRef ds:uri="http://purl.org/dc/elements/1.1/"/>
+    <ds:schemaRef ds:uri="http://schemas.microsoft.com/office/2006/metadata/properties"/>
+    <ds:schemaRef ds:uri="http://schemas.microsoft.com/office/2006/documentManagement/types"/>
     <ds:schemaRef ds:uri="http://purl.org/dc/terms/"/>
+    <ds:schemaRef ds:uri="http://schemas.microsoft.com/office/infopath/2007/PartnerControls"/>
     <ds:schemaRef ds:uri="71af3243-3dd4-4a8d-8c0d-dd76da1f02a5"/>
-    <ds:schemaRef ds:uri="http://purl.org/dc/dcmitype/"/>
-    <ds:schemaRef ds:uri="16c05727-aa75-4e4a-9b5f-8a80a1165891"/>
-    <ds:schemaRef ds:uri="http://schemas.microsoft.com/office/2006/documentManagement/types"/>
     <ds:schemaRef ds:uri="http://www.w3.org/XML/1998/namespace"/>
-    <ds:schemaRef ds:uri="http://purl.org/dc/elements/1.1/"/>
-    <ds:schemaRef ds:uri="http://schemas.microsoft.com/office/infopath/2007/PartnerControls"/>
-    <ds:schemaRef ds:uri="http://schemas.openxmlformats.org/package/2006/metadata/core-properties"/>
-    <ds:schemaRef ds:uri="http://schemas.microsoft.com/office/2006/metadata/properties"/>
-  </ds:schemaRefs>
-</ds:datastoreItem>
-</file>
-
-<file path=customXml/itemProps3.xml><?xml version="1.0" encoding="utf-8"?>
-<ds:datastoreItem xmlns:ds="http://schemas.openxmlformats.org/officeDocument/2006/customXml" ds:itemID="{E3FC8A1C-A436-42C0-AC33-FAFFFAF219BC}">
-  <ds:schemaRefs>
-    <ds:schemaRef ds:uri="http://schemas.microsoft.com/sharepoint/v3/contenttype/forms"/>
   </ds:schemaRefs>
 </ds:datastoreItem>
 </file>
</xml_diff>